<commit_message>
renamed some files, added text and presentation v0.2
</commit_message>
<xml_diff>
--- a/diploma.pptx
+++ b/diploma.pptx
@@ -1,22 +1,28 @@
 
 <file path=ppt/presentation.xml><?xml version="1.0" encoding="utf-8"?>
-<p:presentation xmlns:a="http://schemas.openxmlformats.org/drawingml/2006/main" xmlns:r="http://schemas.openxmlformats.org/officeDocument/2006/relationships" xmlns:p="http://schemas.openxmlformats.org/presentationml/2006/main" saveSubsetFonts="1">
+<p:presentation xmlns:a="http://schemas.openxmlformats.org/drawingml/2006/main" xmlns:r="http://schemas.openxmlformats.org/officeDocument/2006/relationships" xmlns:p="http://schemas.openxmlformats.org/presentationml/2006/main" showSpecialPlsOnTitleSld="0" saveSubsetFonts="1">
   <p:sldMasterIdLst>
     <p:sldMasterId id="2147483648" r:id="rId1"/>
   </p:sldMasterIdLst>
+  <p:notesMasterIdLst>
+    <p:notesMasterId r:id="rId17"/>
+  </p:notesMasterIdLst>
   <p:sldIdLst>
     <p:sldId id="256" r:id="rId2"/>
     <p:sldId id="257" r:id="rId3"/>
-    <p:sldId id="258" r:id="rId4"/>
+    <p:sldId id="268" r:id="rId4"/>
     <p:sldId id="259" r:id="rId5"/>
     <p:sldId id="260" r:id="rId6"/>
-    <p:sldId id="261" r:id="rId7"/>
-    <p:sldId id="262" r:id="rId8"/>
-    <p:sldId id="263" r:id="rId9"/>
-    <p:sldId id="264" r:id="rId10"/>
-    <p:sldId id="265" r:id="rId11"/>
-    <p:sldId id="267" r:id="rId12"/>
-    <p:sldId id="266" r:id="rId13"/>
+    <p:sldId id="269" r:id="rId7"/>
+    <p:sldId id="270" r:id="rId8"/>
+    <p:sldId id="261" r:id="rId9"/>
+    <p:sldId id="262" r:id="rId10"/>
+    <p:sldId id="271" r:id="rId11"/>
+    <p:sldId id="263" r:id="rId12"/>
+    <p:sldId id="264" r:id="rId13"/>
+    <p:sldId id="267" r:id="rId14"/>
+    <p:sldId id="266" r:id="rId15"/>
+    <p:sldId id="272" r:id="rId16"/>
   </p:sldIdLst>
   <p:sldSz cx="9144000" cy="6858000" type="screen4x3"/>
   <p:notesSz cx="6858000" cy="9144000"/>
@@ -118,6 +124,356 @@
 </p:presentation>
 </file>
 
+<file path=ppt/notesMasters/notesMaster1.xml><?xml version="1.0" encoding="utf-8"?>
+<p:notesMaster xmlns:a="http://schemas.openxmlformats.org/drawingml/2006/main" xmlns:r="http://schemas.openxmlformats.org/officeDocument/2006/relationships" xmlns:p="http://schemas.openxmlformats.org/presentationml/2006/main">
+  <p:cSld>
+    <p:bg>
+      <p:bgRef idx="1001">
+        <a:schemeClr val="bg1"/>
+      </p:bgRef>
+    </p:bg>
+    <p:spTree>
+      <p:nvGrpSpPr>
+        <p:cNvPr id="1" name=""/>
+        <p:cNvGrpSpPr/>
+        <p:nvPr/>
+      </p:nvGrpSpPr>
+      <p:grpSpPr>
+        <a:xfrm>
+          <a:off x="0" y="0"/>
+          <a:ext cx="0" cy="0"/>
+          <a:chOff x="0" y="0"/>
+          <a:chExt cx="0" cy="0"/>
+        </a:xfrm>
+      </p:grpSpPr>
+      <p:sp>
+        <p:nvSpPr>
+          <p:cNvPr id="2" name="Верхний колонтитул 1"/>
+          <p:cNvSpPr>
+            <a:spLocks noGrp="1"/>
+          </p:cNvSpPr>
+          <p:nvPr>
+            <p:ph type="hdr" sz="quarter"/>
+          </p:nvPr>
+        </p:nvSpPr>
+        <p:spPr>
+          <a:xfrm>
+            <a:off x="0" y="0"/>
+            <a:ext cx="2971800" cy="457200"/>
+          </a:xfrm>
+          <a:prstGeom prst="rect">
+            <a:avLst/>
+          </a:prstGeom>
+        </p:spPr>
+        <p:txBody>
+          <a:bodyPr vert="horz" lIns="91440" tIns="45720" rIns="91440" bIns="45720" rtlCol="0"/>
+          <a:lstStyle>
+            <a:lvl1pPr algn="l">
+              <a:defRPr sz="1200"/>
+            </a:lvl1pPr>
+          </a:lstStyle>
+          <a:p>
+            <a:endParaRPr lang="ru-RU"/>
+          </a:p>
+        </p:txBody>
+      </p:sp>
+      <p:sp>
+        <p:nvSpPr>
+          <p:cNvPr id="3" name="Дата 2"/>
+          <p:cNvSpPr>
+            <a:spLocks noGrp="1"/>
+          </p:cNvSpPr>
+          <p:nvPr>
+            <p:ph type="dt" idx="1"/>
+          </p:nvPr>
+        </p:nvSpPr>
+        <p:spPr>
+          <a:xfrm>
+            <a:off x="3884613" y="0"/>
+            <a:ext cx="2971800" cy="457200"/>
+          </a:xfrm>
+          <a:prstGeom prst="rect">
+            <a:avLst/>
+          </a:prstGeom>
+        </p:spPr>
+        <p:txBody>
+          <a:bodyPr vert="horz" lIns="91440" tIns="45720" rIns="91440" bIns="45720" rtlCol="0"/>
+          <a:lstStyle>
+            <a:lvl1pPr algn="r">
+              <a:defRPr sz="1200"/>
+            </a:lvl1pPr>
+          </a:lstStyle>
+          <a:p>
+            <a:fld id="{48F26FC3-6D43-4653-BB7D-92D923580206}" type="datetimeFigureOut">
+              <a:rPr lang="ru-RU" smtClean="0"/>
+              <a:t>23.04.2015</a:t>
+            </a:fld>
+            <a:endParaRPr lang="ru-RU"/>
+          </a:p>
+        </p:txBody>
+      </p:sp>
+      <p:sp>
+        <p:nvSpPr>
+          <p:cNvPr id="4" name="Образ слайда 3"/>
+          <p:cNvSpPr>
+            <a:spLocks noGrp="1" noRot="1" noChangeAspect="1"/>
+          </p:cNvSpPr>
+          <p:nvPr>
+            <p:ph type="sldImg" idx="2"/>
+          </p:nvPr>
+        </p:nvSpPr>
+        <p:spPr>
+          <a:xfrm>
+            <a:off x="1143000" y="685800"/>
+            <a:ext cx="4572000" cy="3429000"/>
+          </a:xfrm>
+          <a:prstGeom prst="rect">
+            <a:avLst/>
+          </a:prstGeom>
+          <a:noFill/>
+          <a:ln w="12700">
+            <a:solidFill>
+              <a:prstClr val="black"/>
+            </a:solidFill>
+          </a:ln>
+        </p:spPr>
+        <p:txBody>
+          <a:bodyPr vert="horz" lIns="91440" tIns="45720" rIns="91440" bIns="45720" rtlCol="0" anchor="ctr"/>
+          <a:lstStyle/>
+          <a:p>
+            <a:endParaRPr lang="ru-RU"/>
+          </a:p>
+        </p:txBody>
+      </p:sp>
+      <p:sp>
+        <p:nvSpPr>
+          <p:cNvPr id="5" name="Заметки 4"/>
+          <p:cNvSpPr>
+            <a:spLocks noGrp="1"/>
+          </p:cNvSpPr>
+          <p:nvPr>
+            <p:ph type="body" sz="quarter" idx="3"/>
+          </p:nvPr>
+        </p:nvSpPr>
+        <p:spPr>
+          <a:xfrm>
+            <a:off x="685800" y="4343400"/>
+            <a:ext cx="5486400" cy="4114800"/>
+          </a:xfrm>
+          <a:prstGeom prst="rect">
+            <a:avLst/>
+          </a:prstGeom>
+        </p:spPr>
+        <p:txBody>
+          <a:bodyPr vert="horz" lIns="91440" tIns="45720" rIns="91440" bIns="45720" rtlCol="0"/>
+          <a:lstStyle/>
+          <a:p>
+            <a:pPr lvl="0"/>
+            <a:r>
+              <a:rPr lang="ru-RU" smtClean="0"/>
+              <a:t>Образец текста</a:t>
+            </a:r>
+          </a:p>
+          <a:p>
+            <a:pPr lvl="1"/>
+            <a:r>
+              <a:rPr lang="ru-RU" smtClean="0"/>
+              <a:t>Второй уровень</a:t>
+            </a:r>
+          </a:p>
+          <a:p>
+            <a:pPr lvl="2"/>
+            <a:r>
+              <a:rPr lang="ru-RU" smtClean="0"/>
+              <a:t>Третий уровень</a:t>
+            </a:r>
+          </a:p>
+          <a:p>
+            <a:pPr lvl="3"/>
+            <a:r>
+              <a:rPr lang="ru-RU" smtClean="0"/>
+              <a:t>Четвертый уровень</a:t>
+            </a:r>
+          </a:p>
+          <a:p>
+            <a:pPr lvl="4"/>
+            <a:r>
+              <a:rPr lang="ru-RU" smtClean="0"/>
+              <a:t>Пятый уровень</a:t>
+            </a:r>
+            <a:endParaRPr lang="ru-RU"/>
+          </a:p>
+        </p:txBody>
+      </p:sp>
+      <p:sp>
+        <p:nvSpPr>
+          <p:cNvPr id="6" name="Нижний колонтитул 5"/>
+          <p:cNvSpPr>
+            <a:spLocks noGrp="1"/>
+          </p:cNvSpPr>
+          <p:nvPr>
+            <p:ph type="ftr" sz="quarter" idx="4"/>
+          </p:nvPr>
+        </p:nvSpPr>
+        <p:spPr>
+          <a:xfrm>
+            <a:off x="0" y="8685213"/>
+            <a:ext cx="2971800" cy="457200"/>
+          </a:xfrm>
+          <a:prstGeom prst="rect">
+            <a:avLst/>
+          </a:prstGeom>
+        </p:spPr>
+        <p:txBody>
+          <a:bodyPr vert="horz" lIns="91440" tIns="45720" rIns="91440" bIns="45720" rtlCol="0" anchor="b"/>
+          <a:lstStyle>
+            <a:lvl1pPr algn="l">
+              <a:defRPr sz="1200"/>
+            </a:lvl1pPr>
+          </a:lstStyle>
+          <a:p>
+            <a:endParaRPr lang="ru-RU"/>
+          </a:p>
+        </p:txBody>
+      </p:sp>
+      <p:sp>
+        <p:nvSpPr>
+          <p:cNvPr id="7" name="Номер слайда 6"/>
+          <p:cNvSpPr>
+            <a:spLocks noGrp="1"/>
+          </p:cNvSpPr>
+          <p:nvPr>
+            <p:ph type="sldNum" sz="quarter" idx="5"/>
+          </p:nvPr>
+        </p:nvSpPr>
+        <p:spPr>
+          <a:xfrm>
+            <a:off x="3884613" y="8685213"/>
+            <a:ext cx="2971800" cy="457200"/>
+          </a:xfrm>
+          <a:prstGeom prst="rect">
+            <a:avLst/>
+          </a:prstGeom>
+        </p:spPr>
+        <p:txBody>
+          <a:bodyPr vert="horz" lIns="91440" tIns="45720" rIns="91440" bIns="45720" rtlCol="0" anchor="b"/>
+          <a:lstStyle>
+            <a:lvl1pPr algn="r">
+              <a:defRPr sz="1200"/>
+            </a:lvl1pPr>
+          </a:lstStyle>
+          <a:p>
+            <a:fld id="{3AF43FD3-D956-4F3E-8CB7-1671637258FD}" type="slidenum">
+              <a:rPr lang="ru-RU" smtClean="0"/>
+              <a:t>‹#›</a:t>
+            </a:fld>
+            <a:endParaRPr lang="ru-RU"/>
+          </a:p>
+        </p:txBody>
+      </p:sp>
+    </p:spTree>
+    <p:extLst>
+      <p:ext uri="{BB962C8B-B14F-4D97-AF65-F5344CB8AC3E}">
+        <p14:creationId xmlns:p14="http://schemas.microsoft.com/office/powerpoint/2010/main" val="3000926176"/>
+      </p:ext>
+    </p:extLst>
+  </p:cSld>
+  <p:clrMap bg1="lt1" tx1="dk1" bg2="lt2" tx2="dk2" accent1="accent1" accent2="accent2" accent3="accent3" accent4="accent4" accent5="accent5" accent6="accent6" hlink="hlink" folHlink="folHlink"/>
+  <p:notesStyle>
+    <a:lvl1pPr marL="0" algn="l" defTabSz="914400" rtl="0" eaLnBrk="1" latinLnBrk="0" hangingPunct="1">
+      <a:defRPr sz="1200" kern="1200">
+        <a:solidFill>
+          <a:schemeClr val="tx1"/>
+        </a:solidFill>
+        <a:latin typeface="+mn-lt"/>
+        <a:ea typeface="+mn-ea"/>
+        <a:cs typeface="+mn-cs"/>
+      </a:defRPr>
+    </a:lvl1pPr>
+    <a:lvl2pPr marL="457200" algn="l" defTabSz="914400" rtl="0" eaLnBrk="1" latinLnBrk="0" hangingPunct="1">
+      <a:defRPr sz="1200" kern="1200">
+        <a:solidFill>
+          <a:schemeClr val="tx1"/>
+        </a:solidFill>
+        <a:latin typeface="+mn-lt"/>
+        <a:ea typeface="+mn-ea"/>
+        <a:cs typeface="+mn-cs"/>
+      </a:defRPr>
+    </a:lvl2pPr>
+    <a:lvl3pPr marL="914400" algn="l" defTabSz="914400" rtl="0" eaLnBrk="1" latinLnBrk="0" hangingPunct="1">
+      <a:defRPr sz="1200" kern="1200">
+        <a:solidFill>
+          <a:schemeClr val="tx1"/>
+        </a:solidFill>
+        <a:latin typeface="+mn-lt"/>
+        <a:ea typeface="+mn-ea"/>
+        <a:cs typeface="+mn-cs"/>
+      </a:defRPr>
+    </a:lvl3pPr>
+    <a:lvl4pPr marL="1371600" algn="l" defTabSz="914400" rtl="0" eaLnBrk="1" latinLnBrk="0" hangingPunct="1">
+      <a:defRPr sz="1200" kern="1200">
+        <a:solidFill>
+          <a:schemeClr val="tx1"/>
+        </a:solidFill>
+        <a:latin typeface="+mn-lt"/>
+        <a:ea typeface="+mn-ea"/>
+        <a:cs typeface="+mn-cs"/>
+      </a:defRPr>
+    </a:lvl4pPr>
+    <a:lvl5pPr marL="1828800" algn="l" defTabSz="914400" rtl="0" eaLnBrk="1" latinLnBrk="0" hangingPunct="1">
+      <a:defRPr sz="1200" kern="1200">
+        <a:solidFill>
+          <a:schemeClr val="tx1"/>
+        </a:solidFill>
+        <a:latin typeface="+mn-lt"/>
+        <a:ea typeface="+mn-ea"/>
+        <a:cs typeface="+mn-cs"/>
+      </a:defRPr>
+    </a:lvl5pPr>
+    <a:lvl6pPr marL="2286000" algn="l" defTabSz="914400" rtl="0" eaLnBrk="1" latinLnBrk="0" hangingPunct="1">
+      <a:defRPr sz="1200" kern="1200">
+        <a:solidFill>
+          <a:schemeClr val="tx1"/>
+        </a:solidFill>
+        <a:latin typeface="+mn-lt"/>
+        <a:ea typeface="+mn-ea"/>
+        <a:cs typeface="+mn-cs"/>
+      </a:defRPr>
+    </a:lvl6pPr>
+    <a:lvl7pPr marL="2743200" algn="l" defTabSz="914400" rtl="0" eaLnBrk="1" latinLnBrk="0" hangingPunct="1">
+      <a:defRPr sz="1200" kern="1200">
+        <a:solidFill>
+          <a:schemeClr val="tx1"/>
+        </a:solidFill>
+        <a:latin typeface="+mn-lt"/>
+        <a:ea typeface="+mn-ea"/>
+        <a:cs typeface="+mn-cs"/>
+      </a:defRPr>
+    </a:lvl7pPr>
+    <a:lvl8pPr marL="3200400" algn="l" defTabSz="914400" rtl="0" eaLnBrk="1" latinLnBrk="0" hangingPunct="1">
+      <a:defRPr sz="1200" kern="1200">
+        <a:solidFill>
+          <a:schemeClr val="tx1"/>
+        </a:solidFill>
+        <a:latin typeface="+mn-lt"/>
+        <a:ea typeface="+mn-ea"/>
+        <a:cs typeface="+mn-cs"/>
+      </a:defRPr>
+    </a:lvl8pPr>
+    <a:lvl9pPr marL="3657600" algn="l" defTabSz="914400" rtl="0" eaLnBrk="1" latinLnBrk="0" hangingPunct="1">
+      <a:defRPr sz="1200" kern="1200">
+        <a:solidFill>
+          <a:schemeClr val="tx1"/>
+        </a:solidFill>
+        <a:latin typeface="+mn-lt"/>
+        <a:ea typeface="+mn-ea"/>
+        <a:cs typeface="+mn-cs"/>
+      </a:defRPr>
+    </a:lvl9pPr>
+  </p:notesStyle>
+</p:notesMaster>
+</file>
+
 <file path=ppt/slideLayouts/slideLayout1.xml><?xml version="1.0" encoding="utf-8"?>
 <p:sldLayout xmlns:a="http://schemas.openxmlformats.org/drawingml/2006/main" xmlns:r="http://schemas.openxmlformats.org/officeDocument/2006/relationships" xmlns:p="http://schemas.openxmlformats.org/presentationml/2006/main" type="title" preserve="1">
   <p:cSld name="Титульный слайд">
@@ -297,9 +653,9 @@
           <a:bodyPr/>
           <a:lstStyle/>
           <a:p>
-            <a:fld id="{B4C71EC6-210F-42DE-9C53-41977AD35B3D}" type="datetimeFigureOut">
-              <a:rPr lang="ru-RU" smtClean="0"/>
-              <a:t>07.04.2015</a:t>
+            <a:fld id="{B2AAC938-7A49-4B93-A45A-61BF9C9AE8BA}" type="datetime1">
+              <a:rPr lang="ru-RU" smtClean="0"/>
+              <a:t>23.04.2015</a:t>
             </a:fld>
             <a:endParaRPr lang="ru-RU"/>
           </a:p>
@@ -462,9 +818,9 @@
           <a:bodyPr/>
           <a:lstStyle/>
           <a:p>
-            <a:fld id="{B4C71EC6-210F-42DE-9C53-41977AD35B3D}" type="datetimeFigureOut">
-              <a:rPr lang="ru-RU" smtClean="0"/>
-              <a:t>07.04.2015</a:t>
+            <a:fld id="{1015C061-E4FD-427A-BFEF-C67E7391416B}" type="datetime1">
+              <a:rPr lang="ru-RU" smtClean="0"/>
+              <a:t>23.04.2015</a:t>
             </a:fld>
             <a:endParaRPr lang="ru-RU"/>
           </a:p>
@@ -637,9 +993,9 @@
           <a:bodyPr/>
           <a:lstStyle/>
           <a:p>
-            <a:fld id="{B4C71EC6-210F-42DE-9C53-41977AD35B3D}" type="datetimeFigureOut">
-              <a:rPr lang="ru-RU" smtClean="0"/>
-              <a:t>07.04.2015</a:t>
+            <a:fld id="{C76903C0-B3A0-44B0-805B-96A25019ACAF}" type="datetime1">
+              <a:rPr lang="ru-RU" smtClean="0"/>
+              <a:t>23.04.2015</a:t>
             </a:fld>
             <a:endParaRPr lang="ru-RU"/>
           </a:p>
@@ -802,9 +1158,9 @@
           <a:bodyPr/>
           <a:lstStyle/>
           <a:p>
-            <a:fld id="{B4C71EC6-210F-42DE-9C53-41977AD35B3D}" type="datetimeFigureOut">
-              <a:rPr lang="ru-RU" smtClean="0"/>
-              <a:t>07.04.2015</a:t>
+            <a:fld id="{8F64D7A8-C894-4180-9ECB-7EEFB659DEBD}" type="datetime1">
+              <a:rPr lang="ru-RU" smtClean="0"/>
+              <a:t>23.04.2015</a:t>
             </a:fld>
             <a:endParaRPr lang="ru-RU"/>
           </a:p>
@@ -1043,9 +1399,9 @@
           <a:bodyPr/>
           <a:lstStyle/>
           <a:p>
-            <a:fld id="{B4C71EC6-210F-42DE-9C53-41977AD35B3D}" type="datetimeFigureOut">
-              <a:rPr lang="ru-RU" smtClean="0"/>
-              <a:t>07.04.2015</a:t>
+            <a:fld id="{0A839017-5A8B-4AB6-B095-3F367E197FE0}" type="datetime1">
+              <a:rPr lang="ru-RU" smtClean="0"/>
+              <a:t>23.04.2015</a:t>
             </a:fld>
             <a:endParaRPr lang="ru-RU"/>
           </a:p>
@@ -1326,9 +1682,9 @@
           <a:bodyPr/>
           <a:lstStyle/>
           <a:p>
-            <a:fld id="{B4C71EC6-210F-42DE-9C53-41977AD35B3D}" type="datetimeFigureOut">
-              <a:rPr lang="ru-RU" smtClean="0"/>
-              <a:t>07.04.2015</a:t>
+            <a:fld id="{9B661BC6-BFF7-423E-938C-E5DB3A6E547F}" type="datetime1">
+              <a:rPr lang="ru-RU" smtClean="0"/>
+              <a:t>23.04.2015</a:t>
             </a:fld>
             <a:endParaRPr lang="ru-RU"/>
           </a:p>
@@ -1743,9 +2099,9 @@
           <a:bodyPr/>
           <a:lstStyle/>
           <a:p>
-            <a:fld id="{B4C71EC6-210F-42DE-9C53-41977AD35B3D}" type="datetimeFigureOut">
-              <a:rPr lang="ru-RU" smtClean="0"/>
-              <a:t>07.04.2015</a:t>
+            <a:fld id="{5D5CBD0D-9E02-4BBB-AE44-515B926D0EAB}" type="datetime1">
+              <a:rPr lang="ru-RU" smtClean="0"/>
+              <a:t>23.04.2015</a:t>
             </a:fld>
             <a:endParaRPr lang="ru-RU"/>
           </a:p>
@@ -1856,9 +2212,9 @@
           <a:bodyPr/>
           <a:lstStyle/>
           <a:p>
-            <a:fld id="{B4C71EC6-210F-42DE-9C53-41977AD35B3D}" type="datetimeFigureOut">
-              <a:rPr lang="ru-RU" smtClean="0"/>
-              <a:t>07.04.2015</a:t>
+            <a:fld id="{30ADC242-C05E-4793-944E-EDEEBACAD5D0}" type="datetime1">
+              <a:rPr lang="ru-RU" smtClean="0"/>
+              <a:t>23.04.2015</a:t>
             </a:fld>
             <a:endParaRPr lang="ru-RU"/>
           </a:p>
@@ -1946,9 +2302,9 @@
           <a:bodyPr/>
           <a:lstStyle/>
           <a:p>
-            <a:fld id="{B4C71EC6-210F-42DE-9C53-41977AD35B3D}" type="datetimeFigureOut">
-              <a:rPr lang="ru-RU" smtClean="0"/>
-              <a:t>07.04.2015</a:t>
+            <a:fld id="{89596484-3966-4B5E-B4C4-58E656A7CFFB}" type="datetime1">
+              <a:rPr lang="ru-RU" smtClean="0"/>
+              <a:t>23.04.2015</a:t>
             </a:fld>
             <a:endParaRPr lang="ru-RU"/>
           </a:p>
@@ -2218,9 +2574,9 @@
           <a:bodyPr/>
           <a:lstStyle/>
           <a:p>
-            <a:fld id="{B4C71EC6-210F-42DE-9C53-41977AD35B3D}" type="datetimeFigureOut">
-              <a:rPr lang="ru-RU" smtClean="0"/>
-              <a:t>07.04.2015</a:t>
+            <a:fld id="{ECE85347-A599-409B-A164-AF1AE6410BFB}" type="datetime1">
+              <a:rPr lang="ru-RU" smtClean="0"/>
+              <a:t>23.04.2015</a:t>
             </a:fld>
             <a:endParaRPr lang="ru-RU"/>
           </a:p>
@@ -2466,9 +2822,9 @@
           <a:bodyPr/>
           <a:lstStyle/>
           <a:p>
-            <a:fld id="{B4C71EC6-210F-42DE-9C53-41977AD35B3D}" type="datetimeFigureOut">
-              <a:rPr lang="ru-RU" smtClean="0"/>
-              <a:t>07.04.2015</a:t>
+            <a:fld id="{C9D49783-C308-4C4E-9187-B31D94BA7FD0}" type="datetime1">
+              <a:rPr lang="ru-RU" smtClean="0"/>
+              <a:t>23.04.2015</a:t>
             </a:fld>
             <a:endParaRPr lang="ru-RU"/>
           </a:p>
@@ -2674,9 +3030,9 @@
             </a:lvl1pPr>
           </a:lstStyle>
           <a:p>
-            <a:fld id="{B4C71EC6-210F-42DE-9C53-41977AD35B3D}" type="datetimeFigureOut">
-              <a:rPr lang="ru-RU" smtClean="0"/>
-              <a:t>07.04.2015</a:t>
+            <a:fld id="{D0EB4343-4DD0-441C-8959-336A99512A38}" type="datetime1">
+              <a:rPr lang="ru-RU" smtClean="0"/>
+              <a:t>23.04.2015</a:t>
             </a:fld>
             <a:endParaRPr lang="ru-RU"/>
           </a:p>
@@ -2776,6 +3132,7 @@
     <p:sldLayoutId id="2147483658" r:id="rId10"/>
     <p:sldLayoutId id="2147483659" r:id="rId11"/>
   </p:sldLayoutIdLst>
+  <p:hf hdr="0" ftr="0" dt="0"/>
   <p:txStyles>
     <p:titleStyle>
       <a:lvl1pPr algn="ctr" defTabSz="914400" rtl="0" eaLnBrk="1" latinLnBrk="0" hangingPunct="1">
@@ -3176,7 +3533,7 @@
           <a:p>
             <a:r>
               <a:rPr lang="ru-RU" dirty="0" smtClean="0"/>
-              <a:t>Алгоритм решения (продолжение)</a:t>
+              <a:t>Внутреннее представление документа</a:t>
             </a:r>
             <a:endParaRPr lang="ru-RU" dirty="0"/>
           </a:p>
@@ -3192,9 +3549,16 @@
             <p:ph idx="1"/>
           </p:nvPr>
         </p:nvSpPr>
-        <p:spPr/>
-        <p:txBody>
-          <a:bodyPr/>
+        <p:spPr>
+          <a:xfrm>
+            <a:off x="457200" y="1600201"/>
+            <a:ext cx="8229600" cy="1540768"/>
+          </a:xfrm>
+        </p:spPr>
+        <p:txBody>
+          <a:bodyPr>
+            <a:normAutofit lnSpcReduction="10000"/>
+          </a:bodyPr>
           <a:lstStyle/>
           <a:p>
             <a:pPr marL="0" indent="0">
@@ -3202,33 +3566,77 @@
             </a:pPr>
             <a:r>
               <a:rPr lang="ru-RU" dirty="0" smtClean="0"/>
-              <a:t>4) Если фрагмент был найден, осуществить перенос тегов требования в конечный документ – вначале в дерево внутреннего представления, затем в </a:t>
+              <a:t>На основе </a:t>
             </a:r>
             <a:r>
               <a:rPr lang="en-US" dirty="0" smtClean="0"/>
-              <a:t>JDOM </a:t>
+              <a:t>DOM </a:t>
             </a:r>
             <a:r>
               <a:rPr lang="ru-RU" dirty="0" smtClean="0"/>
-              <a:t>дерево.</a:t>
-            </a:r>
-          </a:p>
-          <a:p>
-            <a:pPr marL="0" indent="0">
-              <a:buNone/>
-            </a:pPr>
-            <a:r>
-              <a:rPr lang="ru-RU" dirty="0" smtClean="0"/>
-              <a:t>В противном случае считается, что фрагмент перенести не удалось</a:t>
+              <a:t>дерева построим другое представление документа, отражающее его структурную разметку.</a:t>
             </a:r>
             <a:endParaRPr lang="ru-RU" dirty="0"/>
           </a:p>
         </p:txBody>
       </p:sp>
+      <p:sp>
+        <p:nvSpPr>
+          <p:cNvPr id="4" name="Номер слайда 3"/>
+          <p:cNvSpPr>
+            <a:spLocks noGrp="1"/>
+          </p:cNvSpPr>
+          <p:nvPr>
+            <p:ph type="sldNum" sz="quarter" idx="12"/>
+          </p:nvPr>
+        </p:nvSpPr>
+        <p:spPr/>
+        <p:txBody>
+          <a:bodyPr/>
+          <a:lstStyle/>
+          <a:p>
+            <a:fld id="{B19B0651-EE4F-4900-A07F-96A6BFA9D0F0}" type="slidenum">
+              <a:rPr lang="ru-RU" smtClean="0"/>
+              <a:t>10</a:t>
+            </a:fld>
+            <a:endParaRPr lang="ru-RU"/>
+          </a:p>
+        </p:txBody>
+      </p:sp>
+      <p:pic>
+        <p:nvPicPr>
+          <p:cNvPr id="5" name="Рисунок 4"/>
+          <p:cNvPicPr>
+            <a:picLocks noChangeAspect="1"/>
+          </p:cNvPicPr>
+          <p:nvPr/>
+        </p:nvPicPr>
+        <p:blipFill>
+          <a:blip r:embed="rId2">
+            <a:extLst>
+              <a:ext uri="{28A0092B-C50C-407E-A947-70E740481C1C}">
+                <a14:useLocalDpi xmlns:a14="http://schemas.microsoft.com/office/drawing/2010/main" val="0"/>
+              </a:ext>
+            </a:extLst>
+          </a:blip>
+          <a:stretch>
+            <a:fillRect/>
+          </a:stretch>
+        </p:blipFill>
+        <p:spPr>
+          <a:xfrm>
+            <a:off x="1187624" y="2969360"/>
+            <a:ext cx="6672461" cy="3871694"/>
+          </a:xfrm>
+          <a:prstGeom prst="rect">
+            <a:avLst/>
+          </a:prstGeom>
+        </p:spPr>
+      </p:pic>
     </p:spTree>
     <p:extLst>
       <p:ext uri="{BB962C8B-B14F-4D97-AF65-F5344CB8AC3E}">
-        <p14:creationId xmlns:p14="http://schemas.microsoft.com/office/powerpoint/2010/main" val="2478348976"/>
+        <p14:creationId xmlns:p14="http://schemas.microsoft.com/office/powerpoint/2010/main" val="3803551776"/>
       </p:ext>
     </p:extLst>
   </p:cSld>
@@ -3279,7 +3687,7 @@
           <a:p>
             <a:r>
               <a:rPr lang="ru-RU" dirty="0" smtClean="0"/>
-              <a:t>Преимущества и недостатки</a:t>
+              <a:t>Основная идея решения</a:t>
             </a:r>
             <a:endParaRPr lang="ru-RU" dirty="0"/>
           </a:p>
@@ -3295,10 +3703,15 @@
             <p:ph idx="1"/>
           </p:nvPr>
         </p:nvSpPr>
-        <p:spPr/>
+        <p:spPr>
+          <a:xfrm>
+            <a:off x="457200" y="1268761"/>
+            <a:ext cx="8229600" cy="4824535"/>
+          </a:xfrm>
+        </p:spPr>
         <p:txBody>
           <a:bodyPr>
-            <a:normAutofit lnSpcReduction="10000"/>
+            <a:normAutofit/>
           </a:bodyPr>
           <a:lstStyle/>
           <a:p>
@@ -3307,38 +3720,88 @@
             </a:pPr>
             <a:r>
               <a:rPr lang="ru-RU" dirty="0" smtClean="0"/>
-              <a:t>+ Добавление и удаление раздела не повлияет на эффективность работы переноса требований.</a:t>
+              <a:t>Заключается в поиске фрагмента требования в секции конечного документа максимальной глубины, путь до которой соответствует пути до секции, где лежит фрагмент в исходном документе.</a:t>
             </a:r>
           </a:p>
           <a:p>
             <a:pPr marL="0" indent="0">
               <a:buNone/>
             </a:pPr>
+            <a:endParaRPr lang="ru-RU" dirty="0"/>
+          </a:p>
+          <a:p>
+            <a:pPr marL="0" indent="0">
+              <a:buNone/>
+            </a:pPr>
             <a:r>
               <a:rPr lang="ru-RU" dirty="0" smtClean="0"/>
-              <a:t>+ Проще добавить возможность переноса фрагментов, для которых находится лишь частичное соответствие</a:t>
-            </a:r>
-          </a:p>
-          <a:p>
-            <a:pPr marL="0" indent="0">
-              <a:buNone/>
-            </a:pPr>
-            <a:r>
-              <a:rPr lang="ru-RU" dirty="0" smtClean="0"/>
-              <a:t>- Алгоритм не будет работать при изменении структуры документа или переносе требований </a:t>
-            </a:r>
-            <a:r>
-              <a:rPr lang="ru-RU" smtClean="0"/>
-              <a:t>между разделами текста.</a:t>
-            </a:r>
-            <a:endParaRPr lang="ru-RU"/>
+              <a:t>Поиск пути в дереве конечного документа осуществляется по тексту и типу вершин в пути до фрагмента в исходном документе.</a:t>
+            </a:r>
+            <a:endParaRPr lang="ru-RU" dirty="0"/>
+          </a:p>
+        </p:txBody>
+      </p:sp>
+      <p:sp>
+        <p:nvSpPr>
+          <p:cNvPr id="10" name="TextBox 9"/>
+          <p:cNvSpPr txBox="1"/>
+          <p:nvPr/>
+        </p:nvSpPr>
+        <p:spPr>
+          <a:xfrm>
+            <a:off x="5508104" y="3379595"/>
+            <a:ext cx="2520280" cy="369332"/>
+          </a:xfrm>
+          <a:prstGeom prst="rect">
+            <a:avLst/>
+          </a:prstGeom>
+          <a:noFill/>
+        </p:spPr>
+        <p:txBody>
+          <a:bodyPr wrap="square" rtlCol="0">
+            <a:spAutoFit/>
+          </a:bodyPr>
+          <a:lstStyle/>
+          <a:p>
+            <a:endParaRPr lang="ru-RU" dirty="0"/>
+          </a:p>
+        </p:txBody>
+      </p:sp>
+      <p:sp>
+        <p:nvSpPr>
+          <p:cNvPr id="8" name="Номер слайда 7"/>
+          <p:cNvSpPr>
+            <a:spLocks noGrp="1"/>
+          </p:cNvSpPr>
+          <p:nvPr>
+            <p:ph type="sldNum" sz="quarter" idx="12"/>
+          </p:nvPr>
+        </p:nvSpPr>
+        <p:spPr/>
+        <p:txBody>
+          <a:bodyPr/>
+          <a:lstStyle/>
+          <a:p>
+            <a:fld id="{B19B0651-EE4F-4900-A07F-96A6BFA9D0F0}" type="slidenum">
+              <a:rPr lang="ru-RU" sz="1800" b="1" smtClean="0">
+                <a:solidFill>
+                  <a:schemeClr val="tx1"/>
+                </a:solidFill>
+              </a:rPr>
+              <a:t>11</a:t>
+            </a:fld>
+            <a:endParaRPr lang="ru-RU" b="1" dirty="0">
+              <a:solidFill>
+                <a:schemeClr val="tx1"/>
+              </a:solidFill>
+            </a:endParaRPr>
           </a:p>
         </p:txBody>
       </p:sp>
     </p:spTree>
     <p:extLst>
       <p:ext uri="{BB962C8B-B14F-4D97-AF65-F5344CB8AC3E}">
-        <p14:creationId xmlns:p14="http://schemas.microsoft.com/office/powerpoint/2010/main" val="4100736619"/>
+        <p14:creationId xmlns:p14="http://schemas.microsoft.com/office/powerpoint/2010/main" val="2325282235"/>
       </p:ext>
     </p:extLst>
   </p:cSld>
@@ -3389,7 +3852,7 @@
           <a:p>
             <a:r>
               <a:rPr lang="ru-RU" dirty="0" smtClean="0"/>
-              <a:t>Полученные результаты</a:t>
+              <a:t>Алгоритм решения</a:t>
             </a:r>
             <a:endParaRPr lang="ru-RU" dirty="0"/>
           </a:p>
@@ -3405,17 +3868,777 @@
             <p:ph idx="1"/>
           </p:nvPr>
         </p:nvSpPr>
-        <p:spPr/>
-        <p:txBody>
-          <a:bodyPr/>
+        <p:spPr>
+          <a:xfrm>
+            <a:off x="467544" y="2564904"/>
+            <a:ext cx="8229600" cy="3888432"/>
+          </a:xfrm>
+        </p:spPr>
+        <p:txBody>
+          <a:bodyPr>
+            <a:normAutofit fontScale="70000" lnSpcReduction="20000"/>
+          </a:bodyPr>
           <a:lstStyle/>
           <a:p>
             <a:pPr marL="0" indent="0">
               <a:buNone/>
             </a:pPr>
             <a:r>
+              <a:rPr lang="ru-RU" dirty="0" smtClean="0">
+                <a:sym typeface="Wingdings" panose="05000000000000000000" pitchFamily="2" charset="2"/>
+              </a:rPr>
+              <a:t>Для каждого фрагмента требования: </a:t>
+            </a:r>
+          </a:p>
+          <a:p>
+            <a:pPr marL="514350" indent="-514350">
+              <a:buAutoNum type="arabicParenR"/>
+            </a:pPr>
+            <a:r>
+              <a:rPr lang="ru-RU" dirty="0" smtClean="0">
+                <a:sym typeface="Wingdings" panose="05000000000000000000" pitchFamily="2" charset="2"/>
+              </a:rPr>
+              <a:t>Получить путь в дереве до секции максимальной глубины, в которой находится этот фрагмент</a:t>
+            </a:r>
+          </a:p>
+          <a:p>
+            <a:pPr marL="514350" indent="-514350">
+              <a:buAutoNum type="arabicParenR"/>
+            </a:pPr>
+            <a:r>
+              <a:rPr lang="ru-RU" dirty="0" smtClean="0">
+                <a:sym typeface="Wingdings" panose="05000000000000000000" pitchFamily="2" charset="2"/>
+              </a:rPr>
+              <a:t>Найти аналогичный путь и секцию в конечном документе, извлечь её текст, и убрать незначащие символы</a:t>
+            </a:r>
+          </a:p>
+          <a:p>
+            <a:pPr marL="514350" indent="-514350">
+              <a:buAutoNum type="arabicParenR"/>
+            </a:pPr>
+            <a:r>
+              <a:rPr lang="ru-RU" dirty="0" smtClean="0">
+                <a:sym typeface="Wingdings" panose="05000000000000000000" pitchFamily="2" charset="2"/>
+              </a:rPr>
+              <a:t>В явном виде попытаться найти текст фрагмента в тексте секции</a:t>
+            </a:r>
+          </a:p>
+          <a:p>
+            <a:pPr marL="514350" indent="-514350">
+              <a:buAutoNum type="arabicParenR"/>
+            </a:pPr>
+            <a:r>
               <a:rPr lang="ru-RU" dirty="0" smtClean="0"/>
-              <a:t>На данный момент алгоритм был протестирован на следующих документах:</a:t>
+              <a:t>Если </a:t>
+            </a:r>
+            <a:r>
+              <a:rPr lang="ru-RU" dirty="0"/>
+              <a:t>фрагмент был найден, осуществить перенос тегов требования в конечный документ </a:t>
+            </a:r>
+            <a:r>
+              <a:rPr lang="ru-RU" dirty="0" smtClean="0"/>
+              <a:t>–  через дерево </a:t>
+            </a:r>
+            <a:r>
+              <a:rPr lang="ru-RU" dirty="0"/>
+              <a:t>внутреннего </a:t>
+            </a:r>
+            <a:r>
+              <a:rPr lang="ru-RU" dirty="0" smtClean="0"/>
+              <a:t>представления</a:t>
+            </a:r>
+            <a:r>
+              <a:rPr lang="ru-RU" dirty="0"/>
+              <a:t> </a:t>
+            </a:r>
+            <a:r>
+              <a:rPr lang="ru-RU" dirty="0" smtClean="0"/>
+              <a:t>и </a:t>
+            </a:r>
+            <a:r>
+              <a:rPr lang="en-US" dirty="0" smtClean="0"/>
+              <a:t>DOM </a:t>
+            </a:r>
+            <a:r>
+              <a:rPr lang="ru-RU" dirty="0" smtClean="0"/>
+              <a:t>дерево.</a:t>
+            </a:r>
+            <a:br>
+              <a:rPr lang="ru-RU" dirty="0" smtClean="0"/>
+            </a:br>
+            <a:r>
+              <a:rPr lang="ru-RU" dirty="0" smtClean="0"/>
+              <a:t>В </a:t>
+            </a:r>
+            <a:r>
+              <a:rPr lang="ru-RU" dirty="0"/>
+              <a:t>противном случае считается, что фрагмент перенести не </a:t>
+            </a:r>
+            <a:r>
+              <a:rPr lang="ru-RU" dirty="0" smtClean="0"/>
+              <a:t>удалось</a:t>
+            </a:r>
+            <a:endParaRPr lang="ru-RU" dirty="0" smtClean="0">
+              <a:sym typeface="Wingdings" panose="05000000000000000000" pitchFamily="2" charset="2"/>
+            </a:endParaRPr>
+          </a:p>
+          <a:p>
+            <a:pPr marL="514350" indent="-514350">
+              <a:buAutoNum type="arabicParenR"/>
+            </a:pPr>
+            <a:endParaRPr lang="ru-RU" dirty="0" smtClean="0">
+              <a:sym typeface="Wingdings" panose="05000000000000000000" pitchFamily="2" charset="2"/>
+            </a:endParaRPr>
+          </a:p>
+          <a:p>
+            <a:pPr marL="514350" indent="-514350">
+              <a:buAutoNum type="arabicParenR"/>
+            </a:pPr>
+            <a:endParaRPr lang="ru-RU" dirty="0"/>
+          </a:p>
+        </p:txBody>
+      </p:sp>
+      <p:sp>
+        <p:nvSpPr>
+          <p:cNvPr id="4" name="Номер слайда 3"/>
+          <p:cNvSpPr>
+            <a:spLocks noGrp="1"/>
+          </p:cNvSpPr>
+          <p:nvPr>
+            <p:ph type="sldNum" sz="quarter" idx="12"/>
+          </p:nvPr>
+        </p:nvSpPr>
+        <p:spPr/>
+        <p:txBody>
+          <a:bodyPr/>
+          <a:lstStyle/>
+          <a:p>
+            <a:fld id="{B19B0651-EE4F-4900-A07F-96A6BFA9D0F0}" type="slidenum">
+              <a:rPr lang="ru-RU" sz="1800" b="1" smtClean="0">
+                <a:solidFill>
+                  <a:schemeClr val="tx1"/>
+                </a:solidFill>
+              </a:rPr>
+              <a:t>12</a:t>
+            </a:fld>
+            <a:endParaRPr lang="ru-RU" b="1" dirty="0">
+              <a:solidFill>
+                <a:schemeClr val="tx1"/>
+              </a:solidFill>
+            </a:endParaRPr>
+          </a:p>
+        </p:txBody>
+      </p:sp>
+      <p:sp>
+        <p:nvSpPr>
+          <p:cNvPr id="5" name="Скругленный прямоугольник 4"/>
+          <p:cNvSpPr/>
+          <p:nvPr/>
+        </p:nvSpPr>
+        <p:spPr>
+          <a:xfrm>
+            <a:off x="251520" y="1412776"/>
+            <a:ext cx="1584176" cy="1008112"/>
+          </a:xfrm>
+          <a:prstGeom prst="roundRect">
+            <a:avLst/>
+          </a:prstGeom>
+          <a:solidFill>
+            <a:schemeClr val="accent1">
+              <a:lumMod val="40000"/>
+              <a:lumOff val="60000"/>
+            </a:schemeClr>
+          </a:solidFill>
+          <a:ln>
+            <a:solidFill>
+              <a:schemeClr val="tx2">
+                <a:lumMod val="40000"/>
+                <a:lumOff val="60000"/>
+              </a:schemeClr>
+            </a:solidFill>
+          </a:ln>
+        </p:spPr>
+        <p:style>
+          <a:lnRef idx="2">
+            <a:schemeClr val="accent1">
+              <a:shade val="50000"/>
+            </a:schemeClr>
+          </a:lnRef>
+          <a:fillRef idx="1">
+            <a:schemeClr val="accent1"/>
+          </a:fillRef>
+          <a:effectRef idx="0">
+            <a:schemeClr val="accent1"/>
+          </a:effectRef>
+          <a:fontRef idx="minor">
+            <a:schemeClr val="lt1"/>
+          </a:fontRef>
+        </p:style>
+        <p:txBody>
+          <a:bodyPr rtlCol="0" anchor="ctr"/>
+          <a:lstStyle/>
+          <a:p>
+            <a:pPr algn="ctr"/>
+            <a:r>
+              <a:rPr lang="ru-RU" dirty="0" smtClean="0">
+                <a:solidFill>
+                  <a:schemeClr val="tx1"/>
+                </a:solidFill>
+              </a:rPr>
+              <a:t>Документ</a:t>
+            </a:r>
+            <a:endParaRPr lang="ru-RU" dirty="0">
+              <a:solidFill>
+                <a:schemeClr val="tx1"/>
+              </a:solidFill>
+            </a:endParaRPr>
+          </a:p>
+        </p:txBody>
+      </p:sp>
+      <p:sp>
+        <p:nvSpPr>
+          <p:cNvPr id="6" name="Скругленный прямоугольник 5"/>
+          <p:cNvSpPr/>
+          <p:nvPr/>
+        </p:nvSpPr>
+        <p:spPr>
+          <a:xfrm>
+            <a:off x="2267744" y="1412776"/>
+            <a:ext cx="1656184" cy="1008112"/>
+          </a:xfrm>
+          <a:prstGeom prst="roundRect">
+            <a:avLst/>
+          </a:prstGeom>
+          <a:solidFill>
+            <a:schemeClr val="accent1">
+              <a:lumMod val="40000"/>
+              <a:lumOff val="60000"/>
+            </a:schemeClr>
+          </a:solidFill>
+          <a:ln>
+            <a:solidFill>
+              <a:schemeClr val="tx2">
+                <a:lumMod val="40000"/>
+                <a:lumOff val="60000"/>
+              </a:schemeClr>
+            </a:solidFill>
+          </a:ln>
+        </p:spPr>
+        <p:style>
+          <a:lnRef idx="2">
+            <a:schemeClr val="accent1">
+              <a:shade val="50000"/>
+            </a:schemeClr>
+          </a:lnRef>
+          <a:fillRef idx="1">
+            <a:schemeClr val="accent1"/>
+          </a:fillRef>
+          <a:effectRef idx="0">
+            <a:schemeClr val="accent1"/>
+          </a:effectRef>
+          <a:fontRef idx="minor">
+            <a:schemeClr val="lt1"/>
+          </a:fontRef>
+        </p:style>
+        <p:txBody>
+          <a:bodyPr rtlCol="0" anchor="ctr"/>
+          <a:lstStyle/>
+          <a:p>
+            <a:pPr algn="ctr"/>
+            <a:r>
+              <a:rPr lang="en-US" dirty="0" smtClean="0">
+                <a:solidFill>
+                  <a:schemeClr val="tx1"/>
+                </a:solidFill>
+              </a:rPr>
+              <a:t>DOM </a:t>
+            </a:r>
+            <a:r>
+              <a:rPr lang="ru-RU" dirty="0" smtClean="0">
+                <a:solidFill>
+                  <a:schemeClr val="tx1"/>
+                </a:solidFill>
+              </a:rPr>
+              <a:t>дерево</a:t>
+            </a:r>
+            <a:endParaRPr lang="ru-RU" dirty="0">
+              <a:solidFill>
+                <a:schemeClr val="tx1"/>
+              </a:solidFill>
+            </a:endParaRPr>
+          </a:p>
+        </p:txBody>
+      </p:sp>
+      <p:sp>
+        <p:nvSpPr>
+          <p:cNvPr id="7" name="Скругленный прямоугольник 6"/>
+          <p:cNvSpPr/>
+          <p:nvPr/>
+        </p:nvSpPr>
+        <p:spPr>
+          <a:xfrm>
+            <a:off x="4355975" y="1412776"/>
+            <a:ext cx="1824283" cy="1008112"/>
+          </a:xfrm>
+          <a:prstGeom prst="roundRect">
+            <a:avLst/>
+          </a:prstGeom>
+          <a:solidFill>
+            <a:schemeClr val="accent1">
+              <a:lumMod val="40000"/>
+              <a:lumOff val="60000"/>
+            </a:schemeClr>
+          </a:solidFill>
+          <a:ln>
+            <a:solidFill>
+              <a:schemeClr val="tx2">
+                <a:lumMod val="40000"/>
+                <a:lumOff val="60000"/>
+              </a:schemeClr>
+            </a:solidFill>
+          </a:ln>
+        </p:spPr>
+        <p:style>
+          <a:lnRef idx="2">
+            <a:schemeClr val="accent1">
+              <a:shade val="50000"/>
+            </a:schemeClr>
+          </a:lnRef>
+          <a:fillRef idx="1">
+            <a:schemeClr val="accent1"/>
+          </a:fillRef>
+          <a:effectRef idx="0">
+            <a:schemeClr val="accent1"/>
+          </a:effectRef>
+          <a:fontRef idx="minor">
+            <a:schemeClr val="lt1"/>
+          </a:fontRef>
+        </p:style>
+        <p:txBody>
+          <a:bodyPr rtlCol="0" anchor="ctr"/>
+          <a:lstStyle/>
+          <a:p>
+            <a:pPr algn="ctr"/>
+            <a:r>
+              <a:rPr lang="ru-RU" dirty="0" smtClean="0">
+                <a:solidFill>
+                  <a:schemeClr val="tx1"/>
+                </a:solidFill>
+              </a:rPr>
+              <a:t>Дерево внутреннего представления</a:t>
+            </a:r>
+            <a:endParaRPr lang="ru-RU" dirty="0">
+              <a:solidFill>
+                <a:schemeClr val="tx1"/>
+              </a:solidFill>
+            </a:endParaRPr>
+          </a:p>
+        </p:txBody>
+      </p:sp>
+      <p:sp>
+        <p:nvSpPr>
+          <p:cNvPr id="8" name="Скругленный прямоугольник 7"/>
+          <p:cNvSpPr/>
+          <p:nvPr/>
+        </p:nvSpPr>
+        <p:spPr>
+          <a:xfrm>
+            <a:off x="6732240" y="1412776"/>
+            <a:ext cx="1656184" cy="1008112"/>
+          </a:xfrm>
+          <a:prstGeom prst="roundRect">
+            <a:avLst/>
+          </a:prstGeom>
+          <a:solidFill>
+            <a:schemeClr val="accent1">
+              <a:lumMod val="40000"/>
+              <a:lumOff val="60000"/>
+            </a:schemeClr>
+          </a:solidFill>
+          <a:ln>
+            <a:solidFill>
+              <a:schemeClr val="tx2">
+                <a:lumMod val="40000"/>
+                <a:lumOff val="60000"/>
+              </a:schemeClr>
+            </a:solidFill>
+          </a:ln>
+        </p:spPr>
+        <p:style>
+          <a:lnRef idx="2">
+            <a:schemeClr val="accent1">
+              <a:shade val="50000"/>
+            </a:schemeClr>
+          </a:lnRef>
+          <a:fillRef idx="1">
+            <a:schemeClr val="accent1"/>
+          </a:fillRef>
+          <a:effectRef idx="0">
+            <a:schemeClr val="accent1"/>
+          </a:effectRef>
+          <a:fontRef idx="minor">
+            <a:schemeClr val="lt1"/>
+          </a:fontRef>
+        </p:style>
+        <p:txBody>
+          <a:bodyPr rtlCol="0" anchor="ctr"/>
+          <a:lstStyle/>
+          <a:p>
+            <a:pPr algn="ctr"/>
+            <a:r>
+              <a:rPr lang="ru-RU" dirty="0" smtClean="0">
+                <a:solidFill>
+                  <a:schemeClr val="tx1"/>
+                </a:solidFill>
+              </a:rPr>
+              <a:t>Извлечение фрагментов требований</a:t>
+            </a:r>
+            <a:endParaRPr lang="ru-RU" dirty="0">
+              <a:solidFill>
+                <a:schemeClr val="tx1"/>
+              </a:solidFill>
+            </a:endParaRPr>
+          </a:p>
+        </p:txBody>
+      </p:sp>
+      <p:sp>
+        <p:nvSpPr>
+          <p:cNvPr id="9" name="Стрелка вправо 8"/>
+          <p:cNvSpPr/>
+          <p:nvPr/>
+        </p:nvSpPr>
+        <p:spPr>
+          <a:xfrm>
+            <a:off x="1835696" y="1674516"/>
+            <a:ext cx="432048" cy="484632"/>
+          </a:xfrm>
+          <a:prstGeom prst="rightArrow">
+            <a:avLst/>
+          </a:prstGeom>
+        </p:spPr>
+        <p:style>
+          <a:lnRef idx="2">
+            <a:schemeClr val="accent1">
+              <a:shade val="50000"/>
+            </a:schemeClr>
+          </a:lnRef>
+          <a:fillRef idx="1">
+            <a:schemeClr val="accent1"/>
+          </a:fillRef>
+          <a:effectRef idx="0">
+            <a:schemeClr val="accent1"/>
+          </a:effectRef>
+          <a:fontRef idx="minor">
+            <a:schemeClr val="lt1"/>
+          </a:fontRef>
+        </p:style>
+        <p:txBody>
+          <a:bodyPr rtlCol="0" anchor="ctr"/>
+          <a:lstStyle/>
+          <a:p>
+            <a:pPr algn="ctr"/>
+            <a:endParaRPr lang="ru-RU"/>
+          </a:p>
+        </p:txBody>
+      </p:sp>
+      <p:sp>
+        <p:nvSpPr>
+          <p:cNvPr id="10" name="Стрелка вправо 9"/>
+          <p:cNvSpPr/>
+          <p:nvPr/>
+        </p:nvSpPr>
+        <p:spPr>
+          <a:xfrm>
+            <a:off x="3943431" y="1674516"/>
+            <a:ext cx="412545" cy="484632"/>
+          </a:xfrm>
+          <a:prstGeom prst="rightArrow">
+            <a:avLst/>
+          </a:prstGeom>
+        </p:spPr>
+        <p:style>
+          <a:lnRef idx="2">
+            <a:schemeClr val="accent1">
+              <a:shade val="50000"/>
+            </a:schemeClr>
+          </a:lnRef>
+          <a:fillRef idx="1">
+            <a:schemeClr val="accent1"/>
+          </a:fillRef>
+          <a:effectRef idx="0">
+            <a:schemeClr val="accent1"/>
+          </a:effectRef>
+          <a:fontRef idx="minor">
+            <a:schemeClr val="lt1"/>
+          </a:fontRef>
+        </p:style>
+        <p:txBody>
+          <a:bodyPr rtlCol="0" anchor="ctr"/>
+          <a:lstStyle/>
+          <a:p>
+            <a:pPr algn="ctr"/>
+            <a:endParaRPr lang="ru-RU"/>
+          </a:p>
+        </p:txBody>
+      </p:sp>
+      <p:sp>
+        <p:nvSpPr>
+          <p:cNvPr id="11" name="Стрелка вправо 10"/>
+          <p:cNvSpPr/>
+          <p:nvPr/>
+        </p:nvSpPr>
+        <p:spPr>
+          <a:xfrm>
+            <a:off x="6180259" y="1674516"/>
+            <a:ext cx="551981" cy="484632"/>
+          </a:xfrm>
+          <a:prstGeom prst="rightArrow">
+            <a:avLst/>
+          </a:prstGeom>
+        </p:spPr>
+        <p:style>
+          <a:lnRef idx="2">
+            <a:schemeClr val="accent1">
+              <a:shade val="50000"/>
+            </a:schemeClr>
+          </a:lnRef>
+          <a:fillRef idx="1">
+            <a:schemeClr val="accent1"/>
+          </a:fillRef>
+          <a:effectRef idx="0">
+            <a:schemeClr val="accent1"/>
+          </a:effectRef>
+          <a:fontRef idx="minor">
+            <a:schemeClr val="lt1"/>
+          </a:fontRef>
+        </p:style>
+        <p:txBody>
+          <a:bodyPr rtlCol="0" anchor="ctr"/>
+          <a:lstStyle/>
+          <a:p>
+            <a:pPr algn="ctr"/>
+            <a:endParaRPr lang="ru-RU"/>
+          </a:p>
+        </p:txBody>
+      </p:sp>
+    </p:spTree>
+    <p:extLst>
+      <p:ext uri="{BB962C8B-B14F-4D97-AF65-F5344CB8AC3E}">
+        <p14:creationId xmlns:p14="http://schemas.microsoft.com/office/powerpoint/2010/main" val="1908474416"/>
+      </p:ext>
+    </p:extLst>
+  </p:cSld>
+  <p:clrMapOvr>
+    <a:masterClrMapping/>
+  </p:clrMapOvr>
+  <p:timing>
+    <p:tnLst>
+      <p:par>
+        <p:cTn id="1" dur="indefinite" restart="never" nodeType="tmRoot"/>
+      </p:par>
+    </p:tnLst>
+  </p:timing>
+</p:sld>
+</file>
+
+<file path=ppt/slides/slide13.xml><?xml version="1.0" encoding="utf-8"?>
+<p:sld xmlns:a="http://schemas.openxmlformats.org/drawingml/2006/main" xmlns:r="http://schemas.openxmlformats.org/officeDocument/2006/relationships" xmlns:p="http://schemas.openxmlformats.org/presentationml/2006/main">
+  <p:cSld>
+    <p:spTree>
+      <p:nvGrpSpPr>
+        <p:cNvPr id="1" name=""/>
+        <p:cNvGrpSpPr/>
+        <p:nvPr/>
+      </p:nvGrpSpPr>
+      <p:grpSpPr>
+        <a:xfrm>
+          <a:off x="0" y="0"/>
+          <a:ext cx="0" cy="0"/>
+          <a:chOff x="0" y="0"/>
+          <a:chExt cx="0" cy="0"/>
+        </a:xfrm>
+      </p:grpSpPr>
+      <p:sp>
+        <p:nvSpPr>
+          <p:cNvPr id="2" name="Заголовок 1"/>
+          <p:cNvSpPr>
+            <a:spLocks noGrp="1"/>
+          </p:cNvSpPr>
+          <p:nvPr>
+            <p:ph type="title"/>
+          </p:nvPr>
+        </p:nvSpPr>
+        <p:spPr/>
+        <p:txBody>
+          <a:bodyPr/>
+          <a:lstStyle/>
+          <a:p>
+            <a:r>
+              <a:rPr lang="ru-RU" dirty="0" smtClean="0"/>
+              <a:t>Преимущества и недостатки</a:t>
+            </a:r>
+            <a:endParaRPr lang="ru-RU" dirty="0"/>
+          </a:p>
+        </p:txBody>
+      </p:sp>
+      <p:sp>
+        <p:nvSpPr>
+          <p:cNvPr id="3" name="Объект 2"/>
+          <p:cNvSpPr>
+            <a:spLocks noGrp="1"/>
+          </p:cNvSpPr>
+          <p:nvPr>
+            <p:ph idx="1"/>
+          </p:nvPr>
+        </p:nvSpPr>
+        <p:spPr/>
+        <p:txBody>
+          <a:bodyPr>
+            <a:normAutofit lnSpcReduction="10000"/>
+          </a:bodyPr>
+          <a:lstStyle/>
+          <a:p>
+            <a:pPr marL="0" indent="0">
+              <a:buNone/>
+            </a:pPr>
+            <a:r>
+              <a:rPr lang="ru-RU" dirty="0" smtClean="0"/>
+              <a:t>+ Добавление и удаление раздела не влияет на эффективность работы переноса требований.</a:t>
+            </a:r>
+          </a:p>
+          <a:p>
+            <a:pPr marL="0" indent="0">
+              <a:buNone/>
+            </a:pPr>
+            <a:r>
+              <a:rPr lang="ru-RU" dirty="0" smtClean="0"/>
+              <a:t>+ Проще добавить возможность переноса фрагментов, для которых находится лишь частичное соответствие</a:t>
+            </a:r>
+          </a:p>
+          <a:p>
+            <a:pPr marL="0" indent="0">
+              <a:buNone/>
+            </a:pPr>
+            <a:r>
+              <a:rPr lang="ru-RU" dirty="0" smtClean="0"/>
+              <a:t>- Алгоритм не будет работать при изменении структуры документа или переносе требований между разделами текста.</a:t>
+            </a:r>
+            <a:endParaRPr lang="ru-RU" dirty="0"/>
+          </a:p>
+        </p:txBody>
+      </p:sp>
+      <p:sp>
+        <p:nvSpPr>
+          <p:cNvPr id="4" name="Номер слайда 3"/>
+          <p:cNvSpPr>
+            <a:spLocks noGrp="1"/>
+          </p:cNvSpPr>
+          <p:nvPr>
+            <p:ph type="sldNum" sz="quarter" idx="12"/>
+          </p:nvPr>
+        </p:nvSpPr>
+        <p:spPr/>
+        <p:txBody>
+          <a:bodyPr/>
+          <a:lstStyle/>
+          <a:p>
+            <a:fld id="{B19B0651-EE4F-4900-A07F-96A6BFA9D0F0}" type="slidenum">
+              <a:rPr lang="ru-RU" sz="1800" b="1" smtClean="0">
+                <a:solidFill>
+                  <a:schemeClr val="tx1"/>
+                </a:solidFill>
+              </a:rPr>
+              <a:t>13</a:t>
+            </a:fld>
+            <a:endParaRPr lang="ru-RU" b="1" dirty="0">
+              <a:solidFill>
+                <a:schemeClr val="tx1"/>
+              </a:solidFill>
+            </a:endParaRPr>
+          </a:p>
+        </p:txBody>
+      </p:sp>
+    </p:spTree>
+    <p:extLst>
+      <p:ext uri="{BB962C8B-B14F-4D97-AF65-F5344CB8AC3E}">
+        <p14:creationId xmlns:p14="http://schemas.microsoft.com/office/powerpoint/2010/main" val="4100736619"/>
+      </p:ext>
+    </p:extLst>
+  </p:cSld>
+  <p:clrMapOvr>
+    <a:masterClrMapping/>
+  </p:clrMapOvr>
+  <p:timing>
+    <p:tnLst>
+      <p:par>
+        <p:cTn id="1" dur="indefinite" restart="never" nodeType="tmRoot"/>
+      </p:par>
+    </p:tnLst>
+  </p:timing>
+</p:sld>
+</file>
+
+<file path=ppt/slides/slide14.xml><?xml version="1.0" encoding="utf-8"?>
+<p:sld xmlns:a="http://schemas.openxmlformats.org/drawingml/2006/main" xmlns:r="http://schemas.openxmlformats.org/officeDocument/2006/relationships" xmlns:p="http://schemas.openxmlformats.org/presentationml/2006/main">
+  <p:cSld>
+    <p:spTree>
+      <p:nvGrpSpPr>
+        <p:cNvPr id="1" name=""/>
+        <p:cNvGrpSpPr/>
+        <p:nvPr/>
+      </p:nvGrpSpPr>
+      <p:grpSpPr>
+        <a:xfrm>
+          <a:off x="0" y="0"/>
+          <a:ext cx="0" cy="0"/>
+          <a:chOff x="0" y="0"/>
+          <a:chExt cx="0" cy="0"/>
+        </a:xfrm>
+      </p:grpSpPr>
+      <p:sp>
+        <p:nvSpPr>
+          <p:cNvPr id="2" name="Заголовок 1"/>
+          <p:cNvSpPr>
+            <a:spLocks noGrp="1"/>
+          </p:cNvSpPr>
+          <p:nvPr>
+            <p:ph type="title"/>
+          </p:nvPr>
+        </p:nvSpPr>
+        <p:spPr/>
+        <p:txBody>
+          <a:bodyPr/>
+          <a:lstStyle/>
+          <a:p>
+            <a:r>
+              <a:rPr lang="ru-RU" dirty="0" smtClean="0"/>
+              <a:t>Результаты экспериментов</a:t>
+            </a:r>
+            <a:endParaRPr lang="ru-RU" dirty="0"/>
+          </a:p>
+        </p:txBody>
+      </p:sp>
+      <p:sp>
+        <p:nvSpPr>
+          <p:cNvPr id="3" name="Объект 2"/>
+          <p:cNvSpPr>
+            <a:spLocks noGrp="1"/>
+          </p:cNvSpPr>
+          <p:nvPr>
+            <p:ph idx="1"/>
+          </p:nvPr>
+        </p:nvSpPr>
+        <p:spPr/>
+        <p:txBody>
+          <a:bodyPr/>
+          <a:lstStyle/>
+          <a:p>
+            <a:pPr marL="0" indent="0">
+              <a:buNone/>
+            </a:pPr>
+            <a:r>
+              <a:rPr lang="ru-RU" dirty="0" smtClean="0"/>
+              <a:t>Алгоритм был протестирован на следующих документах:</a:t>
             </a:r>
           </a:p>
           <a:p>
@@ -3636,10 +4859,143 @@
           </a:graphicData>
         </a:graphic>
       </p:graphicFrame>
+      <p:sp>
+        <p:nvSpPr>
+          <p:cNvPr id="5" name="Номер слайда 4"/>
+          <p:cNvSpPr>
+            <a:spLocks noGrp="1"/>
+          </p:cNvSpPr>
+          <p:nvPr>
+            <p:ph type="sldNum" sz="quarter" idx="12"/>
+          </p:nvPr>
+        </p:nvSpPr>
+        <p:spPr/>
+        <p:txBody>
+          <a:bodyPr/>
+          <a:lstStyle/>
+          <a:p>
+            <a:fld id="{B19B0651-EE4F-4900-A07F-96A6BFA9D0F0}" type="slidenum">
+              <a:rPr lang="ru-RU" sz="1800" b="1" smtClean="0">
+                <a:solidFill>
+                  <a:schemeClr val="tx1"/>
+                </a:solidFill>
+              </a:rPr>
+              <a:t>14</a:t>
+            </a:fld>
+            <a:endParaRPr lang="ru-RU" b="1" dirty="0">
+              <a:solidFill>
+                <a:schemeClr val="tx1"/>
+              </a:solidFill>
+            </a:endParaRPr>
+          </a:p>
+        </p:txBody>
+      </p:sp>
     </p:spTree>
     <p:extLst>
       <p:ext uri="{BB962C8B-B14F-4D97-AF65-F5344CB8AC3E}">
         <p14:creationId xmlns:p14="http://schemas.microsoft.com/office/powerpoint/2010/main" val="3669346559"/>
+      </p:ext>
+    </p:extLst>
+  </p:cSld>
+  <p:clrMapOvr>
+    <a:masterClrMapping/>
+  </p:clrMapOvr>
+  <p:timing>
+    <p:tnLst>
+      <p:par>
+        <p:cTn id="1" dur="indefinite" restart="never" nodeType="tmRoot"/>
+      </p:par>
+    </p:tnLst>
+  </p:timing>
+</p:sld>
+</file>
+
+<file path=ppt/slides/slide15.xml><?xml version="1.0" encoding="utf-8"?>
+<p:sld xmlns:a="http://schemas.openxmlformats.org/drawingml/2006/main" xmlns:r="http://schemas.openxmlformats.org/officeDocument/2006/relationships" xmlns:p="http://schemas.openxmlformats.org/presentationml/2006/main">
+  <p:cSld>
+    <p:spTree>
+      <p:nvGrpSpPr>
+        <p:cNvPr id="1" name=""/>
+        <p:cNvGrpSpPr/>
+        <p:nvPr/>
+      </p:nvGrpSpPr>
+      <p:grpSpPr>
+        <a:xfrm>
+          <a:off x="0" y="0"/>
+          <a:ext cx="0" cy="0"/>
+          <a:chOff x="0" y="0"/>
+          <a:chExt cx="0" cy="0"/>
+        </a:xfrm>
+      </p:grpSpPr>
+      <p:sp>
+        <p:nvSpPr>
+          <p:cNvPr id="2" name="Заголовок 1"/>
+          <p:cNvSpPr>
+            <a:spLocks noGrp="1"/>
+          </p:cNvSpPr>
+          <p:nvPr>
+            <p:ph type="title"/>
+          </p:nvPr>
+        </p:nvSpPr>
+        <p:spPr/>
+        <p:txBody>
+          <a:bodyPr/>
+          <a:lstStyle/>
+          <a:p>
+            <a:r>
+              <a:rPr lang="ru-RU" dirty="0" smtClean="0"/>
+              <a:t>Заключение</a:t>
+            </a:r>
+            <a:endParaRPr lang="ru-RU" dirty="0"/>
+          </a:p>
+        </p:txBody>
+      </p:sp>
+      <p:sp>
+        <p:nvSpPr>
+          <p:cNvPr id="3" name="Объект 2"/>
+          <p:cNvSpPr>
+            <a:spLocks noGrp="1"/>
+          </p:cNvSpPr>
+          <p:nvPr>
+            <p:ph idx="1"/>
+          </p:nvPr>
+        </p:nvSpPr>
+        <p:spPr/>
+        <p:txBody>
+          <a:bodyPr/>
+          <a:lstStyle/>
+          <a:p>
+            <a:endParaRPr lang="ru-RU"/>
+          </a:p>
+        </p:txBody>
+      </p:sp>
+      <p:sp>
+        <p:nvSpPr>
+          <p:cNvPr id="4" name="Номер слайда 3"/>
+          <p:cNvSpPr>
+            <a:spLocks noGrp="1"/>
+          </p:cNvSpPr>
+          <p:nvPr>
+            <p:ph type="sldNum" sz="quarter" idx="12"/>
+          </p:nvPr>
+        </p:nvSpPr>
+        <p:spPr/>
+        <p:txBody>
+          <a:bodyPr/>
+          <a:lstStyle/>
+          <a:p>
+            <a:fld id="{B19B0651-EE4F-4900-A07F-96A6BFA9D0F0}" type="slidenum">
+              <a:rPr lang="ru-RU" smtClean="0"/>
+              <a:t>15</a:t>
+            </a:fld>
+            <a:endParaRPr lang="ru-RU"/>
+          </a:p>
+        </p:txBody>
+      </p:sp>
+    </p:spTree>
+    <p:extLst>
+      <p:ext uri="{BB962C8B-B14F-4D97-AF65-F5344CB8AC3E}">
+        <p14:creationId xmlns:p14="http://schemas.microsoft.com/office/powerpoint/2010/main" val="1771883854"/>
       </p:ext>
     </p:extLst>
   </p:cSld>
@@ -3710,7 +5066,9 @@
         </p:nvSpPr>
         <p:spPr/>
         <p:txBody>
-          <a:bodyPr/>
+          <a:bodyPr>
+            <a:normAutofit lnSpcReduction="10000"/>
+          </a:bodyPr>
           <a:lstStyle/>
           <a:p>
             <a:pPr marL="0" indent="0">
@@ -3718,86 +5076,70 @@
             </a:pPr>
             <a:r>
               <a:rPr lang="ru-RU" dirty="0" smtClean="0"/>
-              <a:t>Документация </a:t>
-            </a:r>
-            <a:r>
-              <a:rPr lang="en-US" dirty="0" smtClean="0">
-                <a:sym typeface="Wingdings" panose="05000000000000000000" pitchFamily="2" charset="2"/>
+              <a:t>Требования являются одними из важнейших проектных документов.</a:t>
+            </a:r>
+          </a:p>
+          <a:p>
+            <a:pPr marL="0" indent="0">
+              <a:buNone/>
+            </a:pPr>
+            <a:endParaRPr lang="ru-RU" dirty="0" smtClean="0"/>
+          </a:p>
+          <a:p>
+            <a:pPr marL="0" indent="0">
+              <a:buNone/>
+            </a:pPr>
+            <a:r>
+              <a:rPr lang="ru-RU" dirty="0" smtClean="0"/>
+              <a:t>Работа с требованиями происходит в течение всего жизненного цикла программной системы.</a:t>
+            </a:r>
+          </a:p>
+          <a:p>
+            <a:pPr marL="0" indent="0">
+              <a:buNone/>
+            </a:pPr>
+            <a:endParaRPr lang="ru-RU" dirty="0"/>
+          </a:p>
+          <a:p>
+            <a:pPr marL="0" indent="0">
+              <a:buNone/>
+            </a:pPr>
+            <a:r>
+              <a:rPr lang="ru-RU" dirty="0" smtClean="0"/>
+              <a:t>При изменении систем происходят изменения требований.</a:t>
+            </a:r>
+            <a:endParaRPr lang="ru-RU" dirty="0"/>
+          </a:p>
+        </p:txBody>
+      </p:sp>
+      <p:sp>
+        <p:nvSpPr>
+          <p:cNvPr id="4" name="Номер слайда 3"/>
+          <p:cNvSpPr>
+            <a:spLocks noGrp="1"/>
+          </p:cNvSpPr>
+          <p:nvPr>
+            <p:ph type="sldNum" sz="quarter" idx="12"/>
+          </p:nvPr>
+        </p:nvSpPr>
+        <p:spPr/>
+        <p:txBody>
+          <a:bodyPr/>
+          <a:lstStyle/>
+          <a:p>
+            <a:fld id="{B19B0651-EE4F-4900-A07F-96A6BFA9D0F0}" type="slidenum">
+              <a:rPr lang="ru-RU" sz="1800" b="1" smtClean="0">
+                <a:solidFill>
+                  <a:schemeClr val="tx1"/>
+                </a:solidFill>
               </a:rPr>
-              <a:t></a:t>
-            </a:r>
-            <a:r>
-              <a:rPr lang="ru-RU" dirty="0" smtClean="0"/>
-              <a:t> Требования </a:t>
-            </a:r>
-            <a:r>
-              <a:rPr lang="en-US" dirty="0" smtClean="0">
-                <a:sym typeface="Wingdings" panose="05000000000000000000" pitchFamily="2" charset="2"/>
-              </a:rPr>
-              <a:t> </a:t>
-            </a:r>
-            <a:r>
-              <a:rPr lang="ru-RU" dirty="0" smtClean="0">
-                <a:sym typeface="Wingdings" panose="05000000000000000000" pitchFamily="2" charset="2"/>
-              </a:rPr>
-              <a:t>Системы управления требованиями.</a:t>
-            </a:r>
-          </a:p>
-          <a:p>
-            <a:pPr marL="0" indent="0">
-              <a:buNone/>
-            </a:pPr>
-            <a:endParaRPr lang="ru-RU" dirty="0">
-              <a:sym typeface="Wingdings" panose="05000000000000000000" pitchFamily="2" charset="2"/>
+              <a:t>2</a:t>
+            </a:fld>
+            <a:endParaRPr lang="ru-RU" sz="1800" b="1" dirty="0">
+              <a:solidFill>
+                <a:schemeClr val="tx1"/>
+              </a:solidFill>
             </a:endParaRPr>
-          </a:p>
-          <a:p>
-            <a:pPr marL="0" indent="0">
-              <a:buNone/>
-            </a:pPr>
-            <a:r>
-              <a:rPr lang="en-US" dirty="0" err="1" smtClean="0">
-                <a:sym typeface="Wingdings" panose="05000000000000000000" pitchFamily="2" charset="2"/>
-              </a:rPr>
-              <a:t>Requality</a:t>
-            </a:r>
-            <a:r>
-              <a:rPr lang="en-US" dirty="0" smtClean="0">
-                <a:sym typeface="Wingdings" panose="05000000000000000000" pitchFamily="2" charset="2"/>
-              </a:rPr>
-              <a:t>  </a:t>
-            </a:r>
-            <a:r>
-              <a:rPr lang="ru-RU" dirty="0" smtClean="0">
-                <a:sym typeface="Wingdings" panose="05000000000000000000" pitchFamily="2" charset="2"/>
-              </a:rPr>
-              <a:t>Возможность работы с </a:t>
-            </a:r>
-            <a:r>
-              <a:rPr lang="ru-RU" dirty="0" err="1" smtClean="0">
-                <a:sym typeface="Wingdings" panose="05000000000000000000" pitchFamily="2" charset="2"/>
-              </a:rPr>
-              <a:t>многоверсионными</a:t>
-            </a:r>
-            <a:r>
-              <a:rPr lang="ru-RU" dirty="0" smtClean="0">
-                <a:sym typeface="Wingdings" panose="05000000000000000000" pitchFamily="2" charset="2"/>
-              </a:rPr>
-              <a:t> документами </a:t>
-            </a:r>
-            <a:r>
-              <a:rPr lang="en-US" dirty="0" smtClean="0">
-                <a:sym typeface="Wingdings" panose="05000000000000000000" pitchFamily="2" charset="2"/>
-              </a:rPr>
-              <a:t></a:t>
-            </a:r>
-            <a:r>
-              <a:rPr lang="ru-RU" dirty="0" smtClean="0">
-                <a:sym typeface="Wingdings" panose="05000000000000000000" pitchFamily="2" charset="2"/>
-              </a:rPr>
-              <a:t> Перенос требований между версиями документа.</a:t>
-            </a:r>
-            <a:endParaRPr lang="ru-RU" dirty="0"/>
           </a:p>
         </p:txBody>
       </p:sp>
@@ -3863,396 +5205,18 @@
       </p:sp>
       <p:sp>
         <p:nvSpPr>
-          <p:cNvPr id="4" name="Прямоугольник 3"/>
-          <p:cNvSpPr/>
-          <p:nvPr/>
-        </p:nvSpPr>
-        <p:spPr>
-          <a:xfrm>
-            <a:off x="3707904" y="1628800"/>
-            <a:ext cx="1512168" cy="4176464"/>
-          </a:xfrm>
-          <a:prstGeom prst="rect">
-            <a:avLst/>
-          </a:prstGeom>
-        </p:spPr>
-        <p:style>
-          <a:lnRef idx="2">
-            <a:schemeClr val="accent1">
-              <a:shade val="50000"/>
-            </a:schemeClr>
-          </a:lnRef>
-          <a:fillRef idx="1">
-            <a:schemeClr val="accent1"/>
-          </a:fillRef>
-          <a:effectRef idx="0">
-            <a:schemeClr val="accent1"/>
-          </a:effectRef>
-          <a:fontRef idx="minor">
-            <a:schemeClr val="lt1"/>
-          </a:fontRef>
-        </p:style>
-        <p:txBody>
-          <a:bodyPr rtlCol="0" anchor="ctr"/>
-          <a:lstStyle/>
-          <a:p>
-            <a:pPr algn="ctr"/>
-            <a:endParaRPr lang="ru-RU"/>
-          </a:p>
-        </p:txBody>
-      </p:sp>
-      <p:sp>
-        <p:nvSpPr>
-          <p:cNvPr id="5" name="Скругленный прямоугольник 4"/>
-          <p:cNvSpPr/>
-          <p:nvPr/>
-        </p:nvSpPr>
-        <p:spPr>
-          <a:xfrm>
-            <a:off x="251520" y="2204864"/>
-            <a:ext cx="3168352" cy="4248472"/>
-          </a:xfrm>
-          <a:prstGeom prst="roundRect">
-            <a:avLst/>
-          </a:prstGeom>
-          <a:solidFill>
-            <a:schemeClr val="accent1">
-              <a:lumMod val="20000"/>
-              <a:lumOff val="80000"/>
-            </a:schemeClr>
-          </a:solidFill>
-        </p:spPr>
-        <p:style>
-          <a:lnRef idx="2">
-            <a:schemeClr val="accent1">
-              <a:shade val="50000"/>
-            </a:schemeClr>
-          </a:lnRef>
-          <a:fillRef idx="1">
-            <a:schemeClr val="accent1"/>
-          </a:fillRef>
-          <a:effectRef idx="0">
-            <a:schemeClr val="accent1"/>
-          </a:effectRef>
-          <a:fontRef idx="minor">
-            <a:schemeClr val="lt1"/>
-          </a:fontRef>
-        </p:style>
-        <p:txBody>
-          <a:bodyPr rtlCol="0" anchor="ctr"/>
-          <a:lstStyle/>
-          <a:p>
-            <a:pPr algn="ctr"/>
-            <a:endParaRPr lang="ru-RU"/>
-          </a:p>
-        </p:txBody>
-      </p:sp>
-      <p:sp>
-        <p:nvSpPr>
-          <p:cNvPr id="6" name="Скругленный прямоугольник 5"/>
-          <p:cNvSpPr/>
-          <p:nvPr/>
-        </p:nvSpPr>
-        <p:spPr>
-          <a:xfrm>
-            <a:off x="5580112" y="2132856"/>
-            <a:ext cx="3312368" cy="4320480"/>
-          </a:xfrm>
-          <a:prstGeom prst="roundRect">
-            <a:avLst/>
-          </a:prstGeom>
-          <a:solidFill>
-            <a:schemeClr val="accent1">
-              <a:lumMod val="20000"/>
-              <a:lumOff val="80000"/>
-            </a:schemeClr>
-          </a:solidFill>
-        </p:spPr>
-        <p:style>
-          <a:lnRef idx="2">
-            <a:schemeClr val="accent1">
-              <a:shade val="50000"/>
-            </a:schemeClr>
-          </a:lnRef>
-          <a:fillRef idx="1">
-            <a:schemeClr val="accent1"/>
-          </a:fillRef>
-          <a:effectRef idx="0">
-            <a:schemeClr val="accent1"/>
-          </a:effectRef>
-          <a:fontRef idx="minor">
-            <a:schemeClr val="lt1"/>
-          </a:fontRef>
-        </p:style>
-        <p:txBody>
-          <a:bodyPr rtlCol="0" anchor="ctr"/>
-          <a:lstStyle/>
-          <a:p>
-            <a:pPr algn="ctr"/>
-            <a:endParaRPr lang="ru-RU"/>
-          </a:p>
-        </p:txBody>
-      </p:sp>
-      <p:sp>
-        <p:nvSpPr>
-          <p:cNvPr id="7" name="TextBox 6"/>
-          <p:cNvSpPr txBox="1"/>
-          <p:nvPr/>
-        </p:nvSpPr>
-        <p:spPr>
-          <a:xfrm>
-            <a:off x="3707904" y="1844824"/>
-            <a:ext cx="1512168" cy="369332"/>
-          </a:xfrm>
-          <a:prstGeom prst="rect">
-            <a:avLst/>
-          </a:prstGeom>
-          <a:noFill/>
-        </p:spPr>
-        <p:txBody>
-          <a:bodyPr wrap="square" rtlCol="0">
-            <a:spAutoFit/>
-          </a:bodyPr>
-          <a:lstStyle/>
-          <a:p>
-            <a:r>
-              <a:rPr lang="ru-RU" dirty="0" smtClean="0"/>
-              <a:t>Требование</a:t>
-            </a:r>
-            <a:endParaRPr lang="ru-RU" dirty="0"/>
-          </a:p>
-        </p:txBody>
-      </p:sp>
-      <p:sp>
-        <p:nvSpPr>
-          <p:cNvPr id="8" name="TextBox 7"/>
-          <p:cNvSpPr txBox="1"/>
-          <p:nvPr/>
-        </p:nvSpPr>
-        <p:spPr>
-          <a:xfrm>
-            <a:off x="3923928" y="2132856"/>
-            <a:ext cx="1296144" cy="646331"/>
-          </a:xfrm>
-          <a:prstGeom prst="rect">
-            <a:avLst/>
-          </a:prstGeom>
-          <a:noFill/>
-        </p:spPr>
-        <p:txBody>
-          <a:bodyPr wrap="square" rtlCol="0">
-            <a:spAutoFit/>
-          </a:bodyPr>
-          <a:lstStyle/>
-          <a:p>
-            <a:r>
-              <a:rPr lang="ru-RU" dirty="0" smtClean="0"/>
-              <a:t>Фрагмент1</a:t>
-            </a:r>
-          </a:p>
-          <a:p>
-            <a:r>
-              <a:rPr lang="ru-RU" dirty="0" smtClean="0"/>
-              <a:t>Фрагмент2</a:t>
-            </a:r>
-          </a:p>
-        </p:txBody>
-      </p:sp>
-      <p:sp>
-        <p:nvSpPr>
-          <p:cNvPr id="9" name="TextBox 8"/>
-          <p:cNvSpPr txBox="1"/>
-          <p:nvPr/>
-        </p:nvSpPr>
-        <p:spPr>
-          <a:xfrm>
-            <a:off x="3923928" y="2779187"/>
-            <a:ext cx="648072" cy="369332"/>
-          </a:xfrm>
-          <a:prstGeom prst="rect">
-            <a:avLst/>
-          </a:prstGeom>
-          <a:noFill/>
-        </p:spPr>
-        <p:txBody>
-          <a:bodyPr wrap="square" rtlCol="0">
-            <a:spAutoFit/>
-          </a:bodyPr>
-          <a:lstStyle/>
-          <a:p>
-            <a:r>
-              <a:rPr lang="en-US" dirty="0" smtClean="0"/>
-              <a:t>…</a:t>
-            </a:r>
-            <a:endParaRPr lang="ru-RU" dirty="0"/>
-          </a:p>
-        </p:txBody>
-      </p:sp>
-      <p:sp>
-        <p:nvSpPr>
-          <p:cNvPr id="12" name="Прямоугольник 11"/>
-          <p:cNvSpPr/>
-          <p:nvPr/>
-        </p:nvSpPr>
-        <p:spPr>
-          <a:xfrm>
-            <a:off x="539552" y="3240852"/>
-            <a:ext cx="2016224" cy="369332"/>
-          </a:xfrm>
-          <a:prstGeom prst="rect">
-            <a:avLst/>
-          </a:prstGeom>
-          <a:solidFill>
-            <a:srgbClr val="FFFF00"/>
-          </a:solidFill>
-        </p:spPr>
-        <p:style>
-          <a:lnRef idx="2">
-            <a:schemeClr val="accent1">
-              <a:shade val="50000"/>
-            </a:schemeClr>
-          </a:lnRef>
-          <a:fillRef idx="1">
-            <a:schemeClr val="accent1"/>
-          </a:fillRef>
-          <a:effectRef idx="0">
-            <a:schemeClr val="accent1"/>
-          </a:effectRef>
-          <a:fontRef idx="minor">
-            <a:schemeClr val="lt1"/>
-          </a:fontRef>
-        </p:style>
-        <p:txBody>
-          <a:bodyPr rtlCol="0" anchor="ctr"/>
-          <a:lstStyle/>
-          <a:p>
-            <a:pPr algn="ctr"/>
-            <a:endParaRPr lang="ru-RU"/>
-          </a:p>
-        </p:txBody>
-      </p:sp>
-      <p:sp>
-        <p:nvSpPr>
-          <p:cNvPr id="14" name="Прямоугольник 13"/>
-          <p:cNvSpPr/>
-          <p:nvPr/>
-        </p:nvSpPr>
-        <p:spPr>
-          <a:xfrm>
-            <a:off x="1187624" y="4149080"/>
-            <a:ext cx="1872208" cy="369332"/>
-          </a:xfrm>
-          <a:prstGeom prst="rect">
-            <a:avLst/>
-          </a:prstGeom>
-          <a:solidFill>
-            <a:srgbClr val="FFFF00"/>
-          </a:solidFill>
-        </p:spPr>
-        <p:style>
-          <a:lnRef idx="2">
-            <a:schemeClr val="accent1">
-              <a:shade val="50000"/>
-            </a:schemeClr>
-          </a:lnRef>
-          <a:fillRef idx="1">
-            <a:schemeClr val="accent1"/>
-          </a:fillRef>
-          <a:effectRef idx="0">
-            <a:schemeClr val="accent1"/>
-          </a:effectRef>
-          <a:fontRef idx="minor">
-            <a:schemeClr val="lt1"/>
-          </a:fontRef>
-        </p:style>
-        <p:txBody>
-          <a:bodyPr rtlCol="0" anchor="ctr"/>
-          <a:lstStyle/>
-          <a:p>
-            <a:pPr algn="ctr"/>
-            <a:endParaRPr lang="ru-RU"/>
-          </a:p>
-        </p:txBody>
-      </p:sp>
-      <p:sp>
-        <p:nvSpPr>
-          <p:cNvPr id="10" name="TextBox 9"/>
-          <p:cNvSpPr txBox="1"/>
-          <p:nvPr/>
-        </p:nvSpPr>
-        <p:spPr>
-          <a:xfrm>
-            <a:off x="539552" y="3240852"/>
-            <a:ext cx="2520280" cy="369332"/>
-          </a:xfrm>
-          <a:prstGeom prst="rect">
-            <a:avLst/>
-          </a:prstGeom>
-          <a:noFill/>
-        </p:spPr>
-        <p:txBody>
-          <a:bodyPr wrap="square" rtlCol="0">
-            <a:spAutoFit/>
-          </a:bodyPr>
-          <a:lstStyle/>
-          <a:p>
-            <a:r>
-              <a:rPr lang="ru-RU" dirty="0" smtClean="0"/>
-              <a:t>Текст фрагмента 1</a:t>
-            </a:r>
-            <a:endParaRPr lang="ru-RU" dirty="0"/>
-          </a:p>
-        </p:txBody>
-      </p:sp>
-      <p:sp>
-        <p:nvSpPr>
-          <p:cNvPr id="11" name="TextBox 10"/>
-          <p:cNvSpPr txBox="1"/>
-          <p:nvPr/>
-        </p:nvSpPr>
-        <p:spPr>
-          <a:xfrm>
-            <a:off x="1187624" y="4149080"/>
-            <a:ext cx="2088232" cy="369332"/>
-          </a:xfrm>
-          <a:prstGeom prst="rect">
-            <a:avLst/>
-          </a:prstGeom>
-          <a:noFill/>
-        </p:spPr>
-        <p:txBody>
-          <a:bodyPr wrap="square" rtlCol="0">
-            <a:spAutoFit/>
-          </a:bodyPr>
-          <a:lstStyle/>
-          <a:p>
-            <a:r>
-              <a:rPr lang="ru-RU" dirty="0" smtClean="0"/>
-              <a:t>Текст фрагмента 2</a:t>
-            </a:r>
-            <a:endParaRPr lang="ru-RU" dirty="0"/>
-          </a:p>
-        </p:txBody>
-      </p:sp>
-      <p:sp>
-        <p:nvSpPr>
-          <p:cNvPr id="15" name="TextBox 14"/>
-          <p:cNvSpPr txBox="1"/>
-          <p:nvPr/>
-        </p:nvSpPr>
-        <p:spPr>
-          <a:xfrm>
-            <a:off x="510711" y="1628800"/>
-            <a:ext cx="2736304" cy="369332"/>
-          </a:xfrm>
-          <a:prstGeom prst="rect">
-            <a:avLst/>
-          </a:prstGeom>
-          <a:noFill/>
-        </p:spPr>
-        <p:txBody>
-          <a:bodyPr wrap="square" rtlCol="0">
-            <a:spAutoFit/>
+          <p:cNvPr id="3" name="Объект 2"/>
+          <p:cNvSpPr>
+            <a:spLocks noGrp="1"/>
+          </p:cNvSpPr>
+          <p:nvPr>
+            <p:ph idx="1"/>
+          </p:nvPr>
+        </p:nvSpPr>
+        <p:spPr/>
+        <p:txBody>
+          <a:bodyPr>
+            <a:normAutofit lnSpcReduction="10000"/>
           </a:bodyPr>
           <a:lstStyle/>
           <a:p>
@@ -4260,247 +5224,81 @@
               <a:rPr lang="ru-RU" dirty="0" smtClean="0"/>
               <a:t>Исходный документ</a:t>
             </a:r>
-            <a:endParaRPr lang="ru-RU" dirty="0"/>
-          </a:p>
-        </p:txBody>
-      </p:sp>
-      <p:sp>
-        <p:nvSpPr>
-          <p:cNvPr id="16" name="TextBox 15"/>
-          <p:cNvSpPr txBox="1"/>
-          <p:nvPr/>
-        </p:nvSpPr>
-        <p:spPr>
-          <a:xfrm>
-            <a:off x="6012160" y="1628800"/>
-            <a:ext cx="2448272" cy="369332"/>
-          </a:xfrm>
-          <a:prstGeom prst="rect">
-            <a:avLst/>
-          </a:prstGeom>
-          <a:noFill/>
-        </p:spPr>
-        <p:txBody>
-          <a:bodyPr wrap="square" rtlCol="0">
-            <a:spAutoFit/>
-          </a:bodyPr>
-          <a:lstStyle/>
+          </a:p>
           <a:p>
             <a:r>
               <a:rPr lang="ru-RU" dirty="0" smtClean="0"/>
               <a:t>Конечный документ</a:t>
             </a:r>
+          </a:p>
+          <a:p>
+            <a:r>
+              <a:rPr lang="ru-RU" dirty="0" smtClean="0"/>
+              <a:t>Фрагмент требования</a:t>
+            </a:r>
+          </a:p>
+          <a:p>
+            <a:r>
+              <a:rPr lang="ru-RU" dirty="0" smtClean="0"/>
+              <a:t>Разметка требования</a:t>
+            </a:r>
+          </a:p>
+          <a:p>
+            <a:r>
+              <a:rPr lang="ru-RU" dirty="0" smtClean="0"/>
+              <a:t>Перенос фрагмента требования</a:t>
+            </a:r>
+          </a:p>
+          <a:p>
+            <a:r>
+              <a:rPr lang="ru-RU" dirty="0" smtClean="0"/>
+              <a:t>Перенос требования</a:t>
+            </a:r>
+          </a:p>
+          <a:p>
+            <a:r>
+              <a:rPr lang="ru-RU" dirty="0" smtClean="0"/>
+              <a:t>Структурная разметка документа (разделы, абзацы)</a:t>
+            </a:r>
             <a:endParaRPr lang="ru-RU" dirty="0"/>
           </a:p>
         </p:txBody>
       </p:sp>
-      <p:cxnSp>
-        <p:nvCxnSpPr>
-          <p:cNvPr id="18" name="Прямая со стрелкой 17"/>
-          <p:cNvCxnSpPr/>
-          <p:nvPr/>
-        </p:nvCxnSpPr>
-        <p:spPr>
-          <a:xfrm flipH="1">
-            <a:off x="2555776" y="2348880"/>
-            <a:ext cx="1440160" cy="1076638"/>
-          </a:xfrm>
-          <a:prstGeom prst="straightConnector1">
-            <a:avLst/>
-          </a:prstGeom>
-          <a:ln>
-            <a:solidFill>
-              <a:srgbClr val="FF0000"/>
-            </a:solidFill>
-            <a:tailEnd type="arrow"/>
-          </a:ln>
-        </p:spPr>
-        <p:style>
-          <a:lnRef idx="1">
-            <a:schemeClr val="accent1"/>
-          </a:lnRef>
-          <a:fillRef idx="0">
-            <a:schemeClr val="accent1"/>
-          </a:fillRef>
-          <a:effectRef idx="0">
-            <a:schemeClr val="accent1"/>
-          </a:effectRef>
-          <a:fontRef idx="minor">
-            <a:schemeClr val="tx1"/>
-          </a:fontRef>
-        </p:style>
-      </p:cxnSp>
-      <p:cxnSp>
-        <p:nvCxnSpPr>
-          <p:cNvPr id="21" name="Прямая со стрелкой 20"/>
-          <p:cNvCxnSpPr/>
-          <p:nvPr/>
-        </p:nvCxnSpPr>
-        <p:spPr>
-          <a:xfrm flipH="1">
-            <a:off x="3059832" y="2564904"/>
-            <a:ext cx="936104" cy="1768842"/>
-          </a:xfrm>
-          <a:prstGeom prst="straightConnector1">
-            <a:avLst/>
-          </a:prstGeom>
-          <a:ln>
-            <a:solidFill>
-              <a:srgbClr val="FF0000"/>
-            </a:solidFill>
-            <a:tailEnd type="arrow"/>
-          </a:ln>
-        </p:spPr>
-        <p:style>
-          <a:lnRef idx="1">
-            <a:schemeClr val="accent1"/>
-          </a:lnRef>
-          <a:fillRef idx="0">
-            <a:schemeClr val="accent1"/>
-          </a:fillRef>
-          <a:effectRef idx="0">
-            <a:schemeClr val="accent1"/>
-          </a:effectRef>
-          <a:fontRef idx="minor">
-            <a:schemeClr val="tx1"/>
-          </a:fontRef>
-        </p:style>
-      </p:cxnSp>
-      <p:cxnSp>
-        <p:nvCxnSpPr>
-          <p:cNvPr id="26" name="Прямая со стрелкой 25"/>
-          <p:cNvCxnSpPr/>
-          <p:nvPr/>
-        </p:nvCxnSpPr>
-        <p:spPr>
-          <a:xfrm>
-            <a:off x="5148064" y="2348880"/>
-            <a:ext cx="864096" cy="430307"/>
-          </a:xfrm>
-          <a:prstGeom prst="straightConnector1">
-            <a:avLst/>
-          </a:prstGeom>
-          <a:ln>
-            <a:solidFill>
-              <a:srgbClr val="FF0000"/>
-            </a:solidFill>
-            <a:tailEnd type="arrow"/>
-          </a:ln>
-        </p:spPr>
-        <p:style>
-          <a:lnRef idx="1">
-            <a:schemeClr val="accent1"/>
-          </a:lnRef>
-          <a:fillRef idx="0">
-            <a:schemeClr val="accent1"/>
-          </a:fillRef>
-          <a:effectRef idx="0">
-            <a:schemeClr val="accent1"/>
-          </a:effectRef>
-          <a:fontRef idx="minor">
-            <a:schemeClr val="tx1"/>
-          </a:fontRef>
-        </p:style>
-      </p:cxnSp>
-      <p:cxnSp>
-        <p:nvCxnSpPr>
-          <p:cNvPr id="29" name="Прямая со стрелкой 28"/>
-          <p:cNvCxnSpPr/>
-          <p:nvPr/>
-        </p:nvCxnSpPr>
-        <p:spPr>
-          <a:xfrm>
-            <a:off x="5148064" y="2564904"/>
-            <a:ext cx="720080" cy="860614"/>
-          </a:xfrm>
-          <a:prstGeom prst="straightConnector1">
-            <a:avLst/>
-          </a:prstGeom>
-          <a:ln>
-            <a:solidFill>
-              <a:srgbClr val="FF0000"/>
-            </a:solidFill>
-            <a:tailEnd type="arrow"/>
-          </a:ln>
-        </p:spPr>
-        <p:style>
-          <a:lnRef idx="1">
-            <a:schemeClr val="accent1"/>
-          </a:lnRef>
-          <a:fillRef idx="0">
-            <a:schemeClr val="accent1"/>
-          </a:fillRef>
-          <a:effectRef idx="0">
-            <a:schemeClr val="accent1"/>
-          </a:effectRef>
-          <a:fontRef idx="minor">
-            <a:schemeClr val="tx1"/>
-          </a:fontRef>
-        </p:style>
-      </p:cxnSp>
-      <p:sp>
-        <p:nvSpPr>
-          <p:cNvPr id="30" name="TextBox 29"/>
-          <p:cNvSpPr txBox="1"/>
-          <p:nvPr/>
-        </p:nvSpPr>
-        <p:spPr>
-          <a:xfrm>
-            <a:off x="6012160" y="2702533"/>
-            <a:ext cx="576064" cy="369332"/>
-          </a:xfrm>
-          <a:prstGeom prst="rect">
-            <a:avLst/>
-          </a:prstGeom>
-          <a:noFill/>
-        </p:spPr>
-        <p:txBody>
-          <a:bodyPr wrap="square" rtlCol="0">
-            <a:spAutoFit/>
-          </a:bodyPr>
-          <a:lstStyle/>
-          <a:p>
-            <a:r>
-              <a:rPr lang="ru-RU" dirty="0" smtClean="0"/>
-              <a:t>?</a:t>
-            </a:r>
-            <a:endParaRPr lang="ru-RU" dirty="0"/>
-          </a:p>
-        </p:txBody>
-      </p:sp>
-      <p:sp>
-        <p:nvSpPr>
-          <p:cNvPr id="31" name="TextBox 30"/>
-          <p:cNvSpPr txBox="1"/>
-          <p:nvPr/>
-        </p:nvSpPr>
-        <p:spPr>
-          <a:xfrm>
-            <a:off x="5868144" y="3347700"/>
-            <a:ext cx="288032" cy="369332"/>
-          </a:xfrm>
-          <a:prstGeom prst="rect">
-            <a:avLst/>
-          </a:prstGeom>
-          <a:noFill/>
-        </p:spPr>
-        <p:txBody>
-          <a:bodyPr wrap="square" rtlCol="0">
-            <a:spAutoFit/>
-          </a:bodyPr>
-          <a:lstStyle/>
-          <a:p>
-            <a:r>
-              <a:rPr lang="ru-RU" dirty="0"/>
-              <a:t>?</a:t>
-            </a:r>
+      <p:sp>
+        <p:nvSpPr>
+          <p:cNvPr id="4" name="Номер слайда 3"/>
+          <p:cNvSpPr>
+            <a:spLocks noGrp="1"/>
+          </p:cNvSpPr>
+          <p:nvPr>
+            <p:ph type="sldNum" sz="quarter" idx="12"/>
+          </p:nvPr>
+        </p:nvSpPr>
+        <p:spPr/>
+        <p:txBody>
+          <a:bodyPr/>
+          <a:lstStyle/>
+          <a:p>
+            <a:fld id="{B19B0651-EE4F-4900-A07F-96A6BFA9D0F0}" type="slidenum">
+              <a:rPr lang="ru-RU" sz="1800" b="1" smtClean="0">
+                <a:solidFill>
+                  <a:schemeClr val="tx1"/>
+                </a:solidFill>
+              </a:rPr>
+              <a:t>3</a:t>
+            </a:fld>
+            <a:endParaRPr lang="ru-RU" b="1" dirty="0">
+              <a:solidFill>
+                <a:schemeClr val="tx1"/>
+              </a:solidFill>
+            </a:endParaRPr>
           </a:p>
         </p:txBody>
       </p:sp>
     </p:spTree>
     <p:extLst>
       <p:ext uri="{BB962C8B-B14F-4D97-AF65-F5344CB8AC3E}">
-        <p14:creationId xmlns:p14="http://schemas.microsoft.com/office/powerpoint/2010/main" val="3619290302"/>
+        <p14:creationId xmlns:p14="http://schemas.microsoft.com/office/powerpoint/2010/main" val="3350698662"/>
       </p:ext>
     </p:extLst>
   </p:cSld>
@@ -4551,7 +5349,7 @@
           <a:p>
             <a:r>
               <a:rPr lang="ru-RU" dirty="0" smtClean="0"/>
-              <a:t>Терминология</a:t>
+              <a:t>Выделение требования</a:t>
             </a:r>
             <a:endParaRPr lang="ru-RU" dirty="0"/>
           </a:p>
@@ -4677,8 +5475,8 @@
         </p:nvSpPr>
         <p:spPr>
           <a:xfrm>
-            <a:off x="3851920" y="2492896"/>
-            <a:ext cx="766610" cy="1584176"/>
+            <a:off x="3851920" y="2924944"/>
+            <a:ext cx="766610" cy="1152128"/>
           </a:xfrm>
           <a:prstGeom prst="downArrow">
             <a:avLst/>
@@ -4706,6 +5504,67 @@
           <a:p>
             <a:pPr algn="ctr"/>
             <a:endParaRPr lang="ru-RU"/>
+          </a:p>
+        </p:txBody>
+      </p:sp>
+      <p:sp>
+        <p:nvSpPr>
+          <p:cNvPr id="3" name="TextBox 2"/>
+          <p:cNvSpPr txBox="1"/>
+          <p:nvPr/>
+        </p:nvSpPr>
+        <p:spPr>
+          <a:xfrm>
+            <a:off x="755576" y="2348880"/>
+            <a:ext cx="7488832" cy="369332"/>
+          </a:xfrm>
+          <a:prstGeom prst="rect">
+            <a:avLst/>
+          </a:prstGeom>
+          <a:noFill/>
+        </p:spPr>
+        <p:txBody>
+          <a:bodyPr wrap="square" rtlCol="0">
+            <a:spAutoFit/>
+          </a:bodyPr>
+          <a:lstStyle/>
+          <a:p>
+            <a:r>
+              <a:rPr lang="ru-RU" dirty="0" smtClean="0"/>
+              <a:t>Пример требования, выделенного в документе «название документа»</a:t>
+            </a:r>
+            <a:endParaRPr lang="ru-RU" dirty="0"/>
+          </a:p>
+        </p:txBody>
+      </p:sp>
+      <p:sp>
+        <p:nvSpPr>
+          <p:cNvPr id="7" name="Номер слайда 6"/>
+          <p:cNvSpPr>
+            <a:spLocks noGrp="1"/>
+          </p:cNvSpPr>
+          <p:nvPr>
+            <p:ph type="sldNum" sz="quarter" idx="12"/>
+          </p:nvPr>
+        </p:nvSpPr>
+        <p:spPr/>
+        <p:txBody>
+          <a:bodyPr/>
+          <a:lstStyle/>
+          <a:p>
+            <a:fld id="{B19B0651-EE4F-4900-A07F-96A6BFA9D0F0}" type="slidenum">
+              <a:rPr lang="ru-RU" sz="1800" b="1" smtClean="0">
+                <a:solidFill>
+                  <a:schemeClr val="tx1"/>
+                </a:solidFill>
+              </a:rPr>
+              <a:t>4</a:t>
+            </a:fld>
+            <a:endParaRPr lang="ru-RU" b="1" dirty="0">
+              <a:solidFill>
+                <a:schemeClr val="tx1"/>
+              </a:solidFill>
+            </a:endParaRPr>
           </a:p>
         </p:txBody>
       </p:sp>
@@ -4779,10 +5638,15 @@
             <p:ph idx="1"/>
           </p:nvPr>
         </p:nvSpPr>
-        <p:spPr/>
+        <p:spPr>
+          <a:xfrm>
+            <a:off x="457200" y="1988840"/>
+            <a:ext cx="8229600" cy="4137323"/>
+          </a:xfrm>
+        </p:spPr>
         <p:txBody>
           <a:bodyPr>
-            <a:normAutofit lnSpcReduction="10000"/>
+            <a:normAutofit/>
           </a:bodyPr>
           <a:lstStyle/>
           <a:p>
@@ -4791,16 +5655,39 @@
             </a:pPr>
             <a:r>
               <a:rPr lang="ru-RU" dirty="0" smtClean="0"/>
-              <a:t>Необходимо разработать библиотеку, позволяющую осуществлять перенос требований между версиями документа, </a:t>
-            </a:r>
-            <a:r>
-              <a:rPr lang="ru-RU" dirty="0" err="1" smtClean="0"/>
-              <a:t>т.е</a:t>
-            </a:r>
-            <a:r>
-              <a:rPr lang="ru-RU" dirty="0" smtClean="0"/>
-              <a:t> присваивать каждому требованию статус «перенесено», «частично перенесено», «не перенесено» в зависимости от результата анализа конечного текста и совершать перенос тегов требований в конечный документ в зависимости от присвоенного статуса. </a:t>
-            </a:r>
+              <a:t>Необходимо разработать библиотеку, позволяющую осуществлять перенос требований из исходного документа в конечный.</a:t>
+            </a:r>
+          </a:p>
+        </p:txBody>
+      </p:sp>
+      <p:sp>
+        <p:nvSpPr>
+          <p:cNvPr id="4" name="Номер слайда 3"/>
+          <p:cNvSpPr>
+            <a:spLocks noGrp="1"/>
+          </p:cNvSpPr>
+          <p:nvPr>
+            <p:ph type="sldNum" sz="quarter" idx="12"/>
+          </p:nvPr>
+        </p:nvSpPr>
+        <p:spPr/>
+        <p:txBody>
+          <a:bodyPr/>
+          <a:lstStyle/>
+          <a:p>
+            <a:fld id="{B19B0651-EE4F-4900-A07F-96A6BFA9D0F0}" type="slidenum">
+              <a:rPr lang="ru-RU" sz="1800" b="1" smtClean="0">
+                <a:solidFill>
+                  <a:schemeClr val="tx1"/>
+                </a:solidFill>
+              </a:rPr>
+              <a:t>5</a:t>
+            </a:fld>
+            <a:endParaRPr lang="ru-RU" b="1" dirty="0">
+              <a:solidFill>
+                <a:schemeClr val="tx1"/>
+              </a:solidFill>
+            </a:endParaRPr>
           </a:p>
         </p:txBody>
       </p:sp>
@@ -4853,12 +5740,22 @@
         </p:nvSpPr>
         <p:spPr/>
         <p:txBody>
-          <a:bodyPr/>
+          <a:bodyPr>
+            <a:normAutofit fontScale="90000"/>
+          </a:bodyPr>
           <a:lstStyle/>
           <a:p>
             <a:r>
               <a:rPr lang="ru-RU" dirty="0" smtClean="0"/>
-              <a:t>Существующее решение</a:t>
+              <a:t>Представление документа в виде </a:t>
+            </a:r>
+            <a:r>
+              <a:rPr lang="en-US" dirty="0" smtClean="0"/>
+              <a:t>DOM </a:t>
+            </a:r>
+            <a:r>
+              <a:rPr lang="ru-RU" dirty="0" smtClean="0"/>
+              <a:t>дерева</a:t>
             </a:r>
             <a:endParaRPr lang="ru-RU" dirty="0"/>
           </a:p>
@@ -4874,9 +5771,16 @@
             <p:ph idx="1"/>
           </p:nvPr>
         </p:nvSpPr>
-        <p:spPr/>
-        <p:txBody>
-          <a:bodyPr/>
+        <p:spPr>
+          <a:xfrm>
+            <a:off x="457200" y="1600200"/>
+            <a:ext cx="8229600" cy="1972816"/>
+          </a:xfrm>
+        </p:spPr>
+        <p:txBody>
+          <a:bodyPr>
+            <a:normAutofit lnSpcReduction="10000"/>
+          </a:bodyPr>
           <a:lstStyle/>
           <a:p>
             <a:pPr marL="0" indent="0">
@@ -4884,166 +5788,99 @@
             </a:pPr>
             <a:r>
               <a:rPr lang="ru-RU" dirty="0" smtClean="0"/>
-              <a:t>Документ </a:t>
-            </a:r>
-            <a:r>
-              <a:rPr lang="en-US" dirty="0" smtClean="0">
-                <a:sym typeface="Wingdings" panose="05000000000000000000" pitchFamily="2" charset="2"/>
+              <a:t>Исходны</a:t>
+            </a:r>
+            <a:r>
+              <a:rPr lang="ru-RU" dirty="0"/>
+              <a:t>й</a:t>
+            </a:r>
+            <a:r>
+              <a:rPr lang="ru-RU" dirty="0" smtClean="0"/>
+              <a:t> документ преобразуется в иерархическую структуру (объектную модель), для этого используется библиотека </a:t>
+            </a:r>
+            <a:r>
+              <a:rPr lang="en-US" dirty="0" smtClean="0"/>
+              <a:t>JDOM 2.0.6</a:t>
+            </a:r>
+            <a:r>
+              <a:rPr lang="ru-RU" dirty="0"/>
+              <a:t>.</a:t>
+            </a:r>
+            <a:endParaRPr lang="en-US" dirty="0" smtClean="0"/>
+          </a:p>
+          <a:p>
+            <a:pPr marL="0" indent="0">
+              <a:buNone/>
+            </a:pPr>
+            <a:endParaRPr lang="ru-RU" dirty="0"/>
+          </a:p>
+        </p:txBody>
+      </p:sp>
+      <p:sp>
+        <p:nvSpPr>
+          <p:cNvPr id="4" name="Номер слайда 3"/>
+          <p:cNvSpPr>
+            <a:spLocks noGrp="1"/>
+          </p:cNvSpPr>
+          <p:nvPr>
+            <p:ph type="sldNum" sz="quarter" idx="12"/>
+          </p:nvPr>
+        </p:nvSpPr>
+        <p:spPr/>
+        <p:txBody>
+          <a:bodyPr/>
+          <a:lstStyle/>
+          <a:p>
+            <a:fld id="{B19B0651-EE4F-4900-A07F-96A6BFA9D0F0}" type="slidenum">
+              <a:rPr lang="ru-RU" sz="1800" b="1" smtClean="0">
+                <a:solidFill>
+                  <a:schemeClr val="tx1"/>
+                </a:solidFill>
               </a:rPr>
-              <a:t> JDOM </a:t>
-            </a:r>
-            <a:r>
-              <a:rPr lang="ru-RU" dirty="0" smtClean="0">
-                <a:sym typeface="Wingdings" panose="05000000000000000000" pitchFamily="2" charset="2"/>
-              </a:rPr>
-              <a:t>дерево </a:t>
-            </a:r>
-            <a:r>
-              <a:rPr lang="en-US" dirty="0" smtClean="0">
-                <a:sym typeface="Wingdings" panose="05000000000000000000" pitchFamily="2" charset="2"/>
-              </a:rPr>
-              <a:t> </a:t>
-            </a:r>
-            <a:r>
-              <a:rPr lang="ru-RU" dirty="0" smtClean="0">
-                <a:sym typeface="Wingdings" panose="05000000000000000000" pitchFamily="2" charset="2"/>
-              </a:rPr>
-              <a:t>Извлечение фрагментов требований </a:t>
-            </a:r>
-            <a:r>
-              <a:rPr lang="en-US" dirty="0" smtClean="0">
-                <a:sym typeface="Wingdings" panose="05000000000000000000" pitchFamily="2" charset="2"/>
-              </a:rPr>
-              <a:t> </a:t>
-            </a:r>
-            <a:r>
-              <a:rPr lang="ru-RU" dirty="0" smtClean="0">
-                <a:sym typeface="Wingdings" panose="05000000000000000000" pitchFamily="2" charset="2"/>
-              </a:rPr>
-              <a:t>Удаление тегов, удаление незначащих символов</a:t>
-            </a:r>
-            <a:r>
-              <a:rPr lang="en-US" dirty="0" smtClean="0">
-                <a:sym typeface="Wingdings" panose="05000000000000000000" pitchFamily="2" charset="2"/>
-              </a:rPr>
-              <a:t>  </a:t>
-            </a:r>
-            <a:endParaRPr lang="ru-RU" dirty="0" smtClean="0">
-              <a:sym typeface="Wingdings" panose="05000000000000000000" pitchFamily="2" charset="2"/>
+              <a:t>6</a:t>
+            </a:fld>
+            <a:endParaRPr lang="ru-RU" sz="1800" b="1" dirty="0">
+              <a:solidFill>
+                <a:schemeClr val="tx1"/>
+              </a:solidFill>
             </a:endParaRPr>
           </a:p>
-          <a:p>
-            <a:pPr marL="0" indent="0">
-              <a:buNone/>
-            </a:pPr>
-            <a:r>
-              <a:rPr lang="en-US" dirty="0" smtClean="0">
-                <a:sym typeface="Wingdings" panose="05000000000000000000" pitchFamily="2" charset="2"/>
-              </a:rPr>
-              <a:t>Google-diff </a:t>
-            </a:r>
-            <a:r>
-              <a:rPr lang="ru-RU" dirty="0" smtClean="0">
-                <a:sym typeface="Wingdings" panose="05000000000000000000" pitchFamily="2" charset="2"/>
-              </a:rPr>
-              <a:t></a:t>
-            </a:r>
-            <a:r>
-              <a:rPr lang="en-US" dirty="0" smtClean="0">
-                <a:sym typeface="Wingdings" panose="05000000000000000000" pitchFamily="2" charset="2"/>
-              </a:rPr>
-              <a:t> </a:t>
-            </a:r>
-            <a:r>
-              <a:rPr lang="ru-RU" dirty="0" smtClean="0">
-                <a:sym typeface="Wingdings" panose="05000000000000000000" pitchFamily="2" charset="2"/>
-              </a:rPr>
-              <a:t>список объектов</a:t>
-            </a:r>
-            <a:r>
-              <a:rPr lang="en-US" dirty="0">
-                <a:sym typeface="Wingdings" panose="05000000000000000000" pitchFamily="2" charset="2"/>
-              </a:rPr>
-              <a:t>:</a:t>
-            </a:r>
-            <a:endParaRPr lang="ru-RU" dirty="0" smtClean="0">
-              <a:sym typeface="Wingdings" panose="05000000000000000000" pitchFamily="2" charset="2"/>
-            </a:endParaRPr>
-          </a:p>
-          <a:p>
-            <a:pPr marL="0" indent="0">
-              <a:buNone/>
-            </a:pPr>
-            <a:r>
-              <a:rPr lang="ru-RU" dirty="0" smtClean="0">
-                <a:sym typeface="Wingdings" panose="05000000000000000000" pitchFamily="2" charset="2"/>
-              </a:rPr>
-              <a:t>(</a:t>
-            </a:r>
-            <a:r>
-              <a:rPr lang="en-US" dirty="0" smtClean="0">
-                <a:sym typeface="Wingdings" panose="05000000000000000000" pitchFamily="2" charset="2"/>
-              </a:rPr>
-              <a:t>&lt;type&gt;, &lt;text&gt;)</a:t>
-            </a:r>
-            <a:r>
-              <a:rPr lang="ru-RU" dirty="0" smtClean="0">
-                <a:sym typeface="Wingdings" panose="05000000000000000000" pitchFamily="2" charset="2"/>
-              </a:rPr>
-              <a:t>, </a:t>
-            </a:r>
-            <a:r>
-              <a:rPr lang="en-US" dirty="0" smtClean="0">
-                <a:sym typeface="Wingdings" panose="05000000000000000000" pitchFamily="2" charset="2"/>
-              </a:rPr>
-              <a:t>type – </a:t>
-            </a:r>
-            <a:r>
-              <a:rPr lang="ru-RU" dirty="0" smtClean="0">
-                <a:sym typeface="Wingdings" panose="05000000000000000000" pitchFamily="2" charset="2"/>
-              </a:rPr>
-              <a:t>одного из трех видов:</a:t>
-            </a:r>
-          </a:p>
-          <a:p>
-            <a:pPr marL="0" indent="0">
-              <a:buNone/>
-            </a:pPr>
-            <a:r>
-              <a:rPr lang="en-US" dirty="0" smtClean="0">
-                <a:sym typeface="Wingdings" panose="05000000000000000000" pitchFamily="2" charset="2"/>
-              </a:rPr>
-              <a:t>EQUAL</a:t>
-            </a:r>
-          </a:p>
-          <a:p>
-            <a:pPr marL="0" indent="0">
-              <a:buNone/>
-            </a:pPr>
-            <a:r>
-              <a:rPr lang="en-US" dirty="0" smtClean="0">
-                <a:sym typeface="Wingdings" panose="05000000000000000000" pitchFamily="2" charset="2"/>
-              </a:rPr>
-              <a:t>INSERT</a:t>
-            </a:r>
-          </a:p>
-          <a:p>
-            <a:pPr marL="0" indent="0">
-              <a:buNone/>
-            </a:pPr>
-            <a:r>
-              <a:rPr lang="en-US" dirty="0" smtClean="0">
-                <a:sym typeface="Wingdings" panose="05000000000000000000" pitchFamily="2" charset="2"/>
-              </a:rPr>
-              <a:t>DELETE</a:t>
-            </a:r>
-          </a:p>
-        </p:txBody>
-      </p:sp>
+        </p:txBody>
+      </p:sp>
+      <p:pic>
+        <p:nvPicPr>
+          <p:cNvPr id="6" name="Рисунок 5"/>
+          <p:cNvPicPr>
+            <a:picLocks noChangeAspect="1"/>
+          </p:cNvPicPr>
+          <p:nvPr/>
+        </p:nvPicPr>
+        <p:blipFill>
+          <a:blip r:embed="rId2">
+            <a:extLst>
+              <a:ext uri="{28A0092B-C50C-407E-A947-70E740481C1C}">
+                <a14:useLocalDpi xmlns:a14="http://schemas.microsoft.com/office/drawing/2010/main" val="0"/>
+              </a:ext>
+            </a:extLst>
+          </a:blip>
+          <a:stretch>
+            <a:fillRect/>
+          </a:stretch>
+        </p:blipFill>
+        <p:spPr>
+          <a:xfrm>
+            <a:off x="1331640" y="3332382"/>
+            <a:ext cx="6120679" cy="3408986"/>
+          </a:xfrm>
+          <a:prstGeom prst="rect">
+            <a:avLst/>
+          </a:prstGeom>
+        </p:spPr>
+      </p:pic>
     </p:spTree>
     <p:extLst>
       <p:ext uri="{BB962C8B-B14F-4D97-AF65-F5344CB8AC3E}">
-        <p14:creationId xmlns:p14="http://schemas.microsoft.com/office/powerpoint/2010/main" val="3683249269"/>
+        <p14:creationId xmlns:p14="http://schemas.microsoft.com/office/powerpoint/2010/main" val="892064762"/>
       </p:ext>
     </p:extLst>
   </p:cSld>
@@ -5087,7 +5924,12 @@
             <p:ph type="title"/>
           </p:nvPr>
         </p:nvSpPr>
-        <p:spPr/>
+        <p:spPr>
+          <a:xfrm>
+            <a:off x="457200" y="188640"/>
+            <a:ext cx="8229600" cy="1080120"/>
+          </a:xfrm>
+        </p:spPr>
         <p:txBody>
           <a:bodyPr>
             <a:normAutofit fontScale="90000"/>
@@ -5096,7 +5938,11 @@
           <a:p>
             <a:r>
               <a:rPr lang="ru-RU" dirty="0" smtClean="0"/>
-              <a:t>Существующее решение (продолжение)</a:t>
+              <a:t>Решение, реализованное в </a:t>
+            </a:r>
+            <a:r>
+              <a:rPr lang="en-US" dirty="0" err="1" smtClean="0"/>
+              <a:t>Requality</a:t>
             </a:r>
             <a:endParaRPr lang="ru-RU" dirty="0"/>
           </a:p>
@@ -5104,95 +5950,68 @@
       </p:sp>
       <p:sp>
         <p:nvSpPr>
-          <p:cNvPr id="3" name="Объект 2"/>
-          <p:cNvSpPr>
-            <a:spLocks noGrp="1"/>
-          </p:cNvSpPr>
+          <p:cNvPr id="8" name="Номер слайда 7"/>
+          <p:cNvSpPr>
+            <a:spLocks noGrp="1"/>
+          </p:cNvSpPr>
+          <p:nvPr>
+            <p:ph type="sldNum" sz="quarter" idx="12"/>
+          </p:nvPr>
+        </p:nvSpPr>
+        <p:spPr/>
+        <p:txBody>
+          <a:bodyPr/>
+          <a:lstStyle/>
+          <a:p>
+            <a:fld id="{B19B0651-EE4F-4900-A07F-96A6BFA9D0F0}" type="slidenum">
+              <a:rPr lang="ru-RU" sz="1800" b="1" smtClean="0">
+                <a:solidFill>
+                  <a:schemeClr val="tx1"/>
+                </a:solidFill>
+              </a:rPr>
+              <a:t>7</a:t>
+            </a:fld>
+            <a:endParaRPr lang="ru-RU" b="1" dirty="0">
+              <a:solidFill>
+                <a:schemeClr val="tx1"/>
+              </a:solidFill>
+            </a:endParaRPr>
+          </a:p>
+        </p:txBody>
+      </p:sp>
+      <p:pic>
+        <p:nvPicPr>
+          <p:cNvPr id="4" name="Объект 3"/>
+          <p:cNvPicPr>
+            <a:picLocks noGrp="1" noChangeAspect="1"/>
+          </p:cNvPicPr>
           <p:nvPr>
             <p:ph idx="1"/>
           </p:nvPr>
-        </p:nvSpPr>
-        <p:spPr/>
-        <p:txBody>
-          <a:bodyPr/>
-          <a:lstStyle/>
-          <a:p>
-            <a:pPr marL="0" indent="0">
-              <a:buNone/>
-            </a:pPr>
-            <a:r>
-              <a:rPr lang="ru-RU" dirty="0" smtClean="0"/>
-              <a:t>Если фрагмент требования лежит в объекте </a:t>
-            </a:r>
-            <a:r>
-              <a:rPr lang="en-US" dirty="0" smtClean="0"/>
-              <a:t>EQUAL</a:t>
-            </a:r>
-            <a:r>
-              <a:rPr lang="ru-RU" dirty="0" smtClean="0"/>
-              <a:t>, то фрагмент можно перенести.</a:t>
-            </a:r>
-          </a:p>
-          <a:p>
-            <a:pPr marL="0" indent="0">
-              <a:buNone/>
-            </a:pPr>
-            <a:endParaRPr lang="ru-RU" dirty="0"/>
-          </a:p>
-          <a:p>
-            <a:pPr marL="0" indent="0">
-              <a:buNone/>
-            </a:pPr>
-            <a:r>
-              <a:rPr lang="ru-RU" dirty="0" smtClean="0"/>
-              <a:t>Преимущества и недостатки:</a:t>
-            </a:r>
-          </a:p>
-          <a:p>
-            <a:pPr marL="0" indent="0">
-              <a:buNone/>
-            </a:pPr>
-            <a:r>
-              <a:rPr lang="ru-RU" dirty="0" smtClean="0"/>
-              <a:t>+ Независимость от </a:t>
-            </a:r>
-            <a:r>
-              <a:rPr lang="en-US" dirty="0" err="1" smtClean="0"/>
-              <a:t>xhtml</a:t>
-            </a:r>
-            <a:r>
-              <a:rPr lang="en-US" dirty="0" smtClean="0"/>
-              <a:t> </a:t>
-            </a:r>
-            <a:r>
-              <a:rPr lang="ru-RU" dirty="0" smtClean="0"/>
-              <a:t>структуры документов</a:t>
-            </a:r>
-          </a:p>
-          <a:p>
-            <a:pPr marL="0" indent="0">
-              <a:buNone/>
-            </a:pPr>
-            <a:r>
-              <a:rPr lang="ru-RU" dirty="0" smtClean="0"/>
-              <a:t>- Зависимость от неидеальной работы </a:t>
-            </a:r>
-            <a:r>
-              <a:rPr lang="en-US" dirty="0" smtClean="0"/>
-              <a:t>diff </a:t>
-            </a:r>
-            <a:r>
-              <a:rPr lang="ru-RU" dirty="0" smtClean="0"/>
-              <a:t>алгоритма</a:t>
-            </a:r>
-            <a:endParaRPr lang="ru-RU" dirty="0"/>
-          </a:p>
-        </p:txBody>
-      </p:sp>
+        </p:nvPicPr>
+        <p:blipFill>
+          <a:blip r:embed="rId2">
+            <a:extLst>
+              <a:ext uri="{28A0092B-C50C-407E-A947-70E740481C1C}">
+                <a14:useLocalDpi xmlns:a14="http://schemas.microsoft.com/office/drawing/2010/main" val="0"/>
+              </a:ext>
+            </a:extLst>
+          </a:blip>
+          <a:stretch>
+            <a:fillRect/>
+          </a:stretch>
+        </p:blipFill>
+        <p:spPr>
+          <a:xfrm>
+            <a:off x="2627784" y="1124744"/>
+            <a:ext cx="3858002" cy="5733256"/>
+          </a:xfrm>
+        </p:spPr>
+      </p:pic>
     </p:spTree>
     <p:extLst>
       <p:ext uri="{BB962C8B-B14F-4D97-AF65-F5344CB8AC3E}">
-        <p14:creationId xmlns:p14="http://schemas.microsoft.com/office/powerpoint/2010/main" val="4201563964"/>
+        <p14:creationId xmlns:p14="http://schemas.microsoft.com/office/powerpoint/2010/main" val="187645597"/>
       </p:ext>
     </p:extLst>
   </p:cSld>
@@ -5242,8 +6061,8 @@
           <a:lstStyle/>
           <a:p>
             <a:r>
-              <a:rPr lang="ru-RU" dirty="0" smtClean="0"/>
-              <a:t>Основная идея решения</a:t>
+              <a:rPr lang="en-US" dirty="0" smtClean="0"/>
+              <a:t>Google Diff</a:t>
             </a:r>
             <a:endParaRPr lang="ru-RU" dirty="0"/>
           </a:p>
@@ -5259,455 +6078,145 @@
             <p:ph idx="1"/>
           </p:nvPr>
         </p:nvSpPr>
-        <p:spPr>
-          <a:xfrm>
-            <a:off x="457200" y="1484785"/>
-            <a:ext cx="8229600" cy="1944216"/>
-          </a:xfrm>
-        </p:spPr>
-        <p:txBody>
-          <a:bodyPr>
-            <a:normAutofit fontScale="92500" lnSpcReduction="20000"/>
-          </a:bodyPr>
+        <p:spPr/>
+        <p:txBody>
+          <a:bodyPr/>
           <a:lstStyle/>
           <a:p>
             <a:pPr marL="0" indent="0">
               <a:buNone/>
             </a:pPr>
             <a:r>
-              <a:rPr lang="ru-RU" dirty="0" smtClean="0"/>
-              <a:t>Локализовать место поиска фрагмента в конечном документе – осуществлять поиск только в подсекции документа максимальной глубины, путь до которой в конечном документе совпадает с путем в исходном. </a:t>
-            </a:r>
-            <a:endParaRPr lang="ru-RU" dirty="0"/>
-          </a:p>
-        </p:txBody>
-      </p:sp>
-      <p:sp>
-        <p:nvSpPr>
-          <p:cNvPr id="4" name="TextBox 3"/>
-          <p:cNvSpPr txBox="1"/>
-          <p:nvPr/>
-        </p:nvSpPr>
-        <p:spPr>
-          <a:xfrm>
-            <a:off x="755576" y="3717032"/>
-            <a:ext cx="3024336" cy="369332"/>
-          </a:xfrm>
-          <a:prstGeom prst="rect">
-            <a:avLst/>
-          </a:prstGeom>
-          <a:noFill/>
-        </p:spPr>
-        <p:txBody>
-          <a:bodyPr wrap="square" rtlCol="0">
-            <a:spAutoFit/>
-          </a:bodyPr>
-          <a:lstStyle/>
-          <a:p>
-            <a:r>
-              <a:rPr lang="ru-RU" dirty="0"/>
-              <a:t>3</a:t>
-            </a:r>
-            <a:r>
-              <a:rPr lang="ru-RU" dirty="0" smtClean="0"/>
-              <a:t> Заголовок</a:t>
-            </a:r>
-            <a:endParaRPr lang="ru-RU" dirty="0"/>
-          </a:p>
-        </p:txBody>
-      </p:sp>
-      <p:sp>
-        <p:nvSpPr>
-          <p:cNvPr id="5" name="TextBox 4"/>
-          <p:cNvSpPr txBox="1"/>
-          <p:nvPr/>
-        </p:nvSpPr>
-        <p:spPr>
-          <a:xfrm>
-            <a:off x="1115616" y="4086364"/>
-            <a:ext cx="2016224" cy="646331"/>
-          </a:xfrm>
-          <a:prstGeom prst="rect">
-            <a:avLst/>
-          </a:prstGeom>
-          <a:noFill/>
-        </p:spPr>
-        <p:txBody>
-          <a:bodyPr wrap="square" rtlCol="0">
-            <a:spAutoFit/>
-          </a:bodyPr>
-          <a:lstStyle/>
-          <a:p>
-            <a:r>
-              <a:rPr lang="ru-RU" dirty="0" smtClean="0"/>
-              <a:t>…</a:t>
-            </a:r>
-          </a:p>
-          <a:p>
-            <a:r>
-              <a:rPr lang="ru-RU" dirty="0"/>
-              <a:t>3</a:t>
-            </a:r>
-            <a:r>
-              <a:rPr lang="ru-RU" dirty="0" smtClean="0"/>
-              <a:t>.2 Подзаголовок</a:t>
-            </a:r>
-            <a:endParaRPr lang="ru-RU" dirty="0"/>
-          </a:p>
-        </p:txBody>
-      </p:sp>
-      <p:sp>
-        <p:nvSpPr>
-          <p:cNvPr id="7" name="Прямоугольник 6"/>
-          <p:cNvSpPr/>
-          <p:nvPr/>
-        </p:nvSpPr>
-        <p:spPr>
-          <a:xfrm>
-            <a:off x="1475656" y="4869160"/>
-            <a:ext cx="1656184" cy="646331"/>
-          </a:xfrm>
-          <a:prstGeom prst="rect">
-            <a:avLst/>
-          </a:prstGeom>
-          <a:solidFill>
-            <a:srgbClr val="FFFF00"/>
-          </a:solidFill>
-        </p:spPr>
-        <p:style>
-          <a:lnRef idx="2">
-            <a:schemeClr val="accent1">
-              <a:shade val="50000"/>
-            </a:schemeClr>
-          </a:lnRef>
-          <a:fillRef idx="1">
-            <a:schemeClr val="accent1"/>
-          </a:fillRef>
-          <a:effectRef idx="0">
-            <a:schemeClr val="accent1"/>
-          </a:effectRef>
-          <a:fontRef idx="minor">
-            <a:schemeClr val="lt1"/>
-          </a:fontRef>
-        </p:style>
-        <p:txBody>
-          <a:bodyPr rtlCol="0" anchor="ctr"/>
-          <a:lstStyle/>
-          <a:p>
-            <a:pPr algn="ctr"/>
-            <a:endParaRPr lang="ru-RU"/>
-          </a:p>
-        </p:txBody>
-      </p:sp>
-      <p:sp>
-        <p:nvSpPr>
-          <p:cNvPr id="6" name="TextBox 5"/>
-          <p:cNvSpPr txBox="1"/>
-          <p:nvPr/>
-        </p:nvSpPr>
-        <p:spPr>
-          <a:xfrm>
-            <a:off x="1475656" y="4869160"/>
-            <a:ext cx="1656184" cy="646331"/>
-          </a:xfrm>
-          <a:prstGeom prst="rect">
-            <a:avLst/>
-          </a:prstGeom>
-          <a:noFill/>
-        </p:spPr>
-        <p:txBody>
-          <a:bodyPr wrap="square" rtlCol="0">
-            <a:spAutoFit/>
-          </a:bodyPr>
-          <a:lstStyle/>
-          <a:p>
-            <a:r>
-              <a:rPr lang="ru-RU" dirty="0" smtClean="0"/>
-              <a:t>Фрагмент требования</a:t>
-            </a:r>
-            <a:endParaRPr lang="ru-RU" dirty="0"/>
-          </a:p>
-        </p:txBody>
-      </p:sp>
-      <p:sp>
-        <p:nvSpPr>
-          <p:cNvPr id="9" name="TextBox 8"/>
-          <p:cNvSpPr txBox="1"/>
-          <p:nvPr/>
-        </p:nvSpPr>
-        <p:spPr>
-          <a:xfrm>
-            <a:off x="251520" y="3356992"/>
-            <a:ext cx="3168352" cy="369332"/>
-          </a:xfrm>
-          <a:prstGeom prst="rect">
-            <a:avLst/>
-          </a:prstGeom>
-          <a:noFill/>
-        </p:spPr>
-        <p:txBody>
-          <a:bodyPr wrap="square" rtlCol="0">
-            <a:spAutoFit/>
-          </a:bodyPr>
-          <a:lstStyle/>
-          <a:p>
-            <a:r>
-              <a:rPr lang="ru-RU" dirty="0" smtClean="0"/>
-              <a:t>Исходный документ</a:t>
-            </a:r>
-            <a:endParaRPr lang="ru-RU" dirty="0"/>
-          </a:p>
-        </p:txBody>
-      </p:sp>
-      <p:sp>
-        <p:nvSpPr>
-          <p:cNvPr id="10" name="TextBox 9"/>
-          <p:cNvSpPr txBox="1"/>
-          <p:nvPr/>
-        </p:nvSpPr>
-        <p:spPr>
-          <a:xfrm>
-            <a:off x="5508104" y="3379595"/>
-            <a:ext cx="2520280" cy="369332"/>
-          </a:xfrm>
-          <a:prstGeom prst="rect">
-            <a:avLst/>
-          </a:prstGeom>
-          <a:noFill/>
-        </p:spPr>
-        <p:txBody>
-          <a:bodyPr wrap="square" rtlCol="0">
-            <a:spAutoFit/>
-          </a:bodyPr>
-          <a:lstStyle/>
-          <a:p>
-            <a:endParaRPr lang="ru-RU" dirty="0"/>
-          </a:p>
-        </p:txBody>
-      </p:sp>
-      <p:sp>
-        <p:nvSpPr>
-          <p:cNvPr id="12" name="TextBox 11"/>
-          <p:cNvSpPr txBox="1"/>
-          <p:nvPr/>
-        </p:nvSpPr>
-        <p:spPr>
-          <a:xfrm>
-            <a:off x="5485331" y="3346786"/>
-            <a:ext cx="2520280" cy="369332"/>
-          </a:xfrm>
-          <a:prstGeom prst="rect">
-            <a:avLst/>
-          </a:prstGeom>
-          <a:noFill/>
-        </p:spPr>
-        <p:txBody>
-          <a:bodyPr wrap="square" rtlCol="0">
-            <a:spAutoFit/>
-          </a:bodyPr>
-          <a:lstStyle/>
-          <a:p>
-            <a:r>
-              <a:rPr lang="ru-RU" dirty="0" smtClean="0"/>
-              <a:t>Конечный документ</a:t>
-            </a:r>
-            <a:endParaRPr lang="ru-RU" dirty="0"/>
-          </a:p>
-        </p:txBody>
-      </p:sp>
-      <p:sp>
-        <p:nvSpPr>
-          <p:cNvPr id="14" name="TextBox 13"/>
-          <p:cNvSpPr txBox="1"/>
-          <p:nvPr/>
-        </p:nvSpPr>
-        <p:spPr>
-          <a:xfrm>
-            <a:off x="6156176" y="3748927"/>
-            <a:ext cx="1728192" cy="369332"/>
-          </a:xfrm>
-          <a:prstGeom prst="rect">
-            <a:avLst/>
-          </a:prstGeom>
-          <a:noFill/>
-        </p:spPr>
-        <p:txBody>
-          <a:bodyPr wrap="square" rtlCol="0">
-            <a:spAutoFit/>
-          </a:bodyPr>
-          <a:lstStyle/>
-          <a:p>
-            <a:r>
-              <a:rPr lang="ru-RU" dirty="0" smtClean="0"/>
-              <a:t>3 Заголовок</a:t>
-            </a:r>
-            <a:endParaRPr lang="ru-RU" dirty="0"/>
-          </a:p>
-        </p:txBody>
-      </p:sp>
-      <p:sp>
-        <p:nvSpPr>
-          <p:cNvPr id="15" name="TextBox 14"/>
-          <p:cNvSpPr txBox="1"/>
-          <p:nvPr/>
-        </p:nvSpPr>
-        <p:spPr>
-          <a:xfrm>
-            <a:off x="6588225" y="4118259"/>
-            <a:ext cx="2232248" cy="646331"/>
-          </a:xfrm>
-          <a:prstGeom prst="rect">
-            <a:avLst/>
-          </a:prstGeom>
-          <a:noFill/>
-        </p:spPr>
-        <p:txBody>
-          <a:bodyPr wrap="square" rtlCol="0">
-            <a:spAutoFit/>
-          </a:bodyPr>
-          <a:lstStyle/>
-          <a:p>
-            <a:r>
-              <a:rPr lang="ru-RU" dirty="0" smtClean="0"/>
-              <a:t>…</a:t>
-            </a:r>
-          </a:p>
-          <a:p>
-            <a:r>
-              <a:rPr lang="ru-RU" dirty="0" smtClean="0"/>
-              <a:t>3.2 Подзаголовок</a:t>
-            </a:r>
-            <a:endParaRPr lang="ru-RU" dirty="0"/>
-          </a:p>
-        </p:txBody>
-      </p:sp>
-      <p:sp>
-        <p:nvSpPr>
-          <p:cNvPr id="18" name="Правая фигурная скобка 17"/>
-          <p:cNvSpPr/>
-          <p:nvPr/>
-        </p:nvSpPr>
-        <p:spPr>
-          <a:xfrm>
-            <a:off x="3419872" y="4409529"/>
-            <a:ext cx="360040" cy="1683767"/>
-          </a:xfrm>
-          <a:prstGeom prst="rightBrace">
-            <a:avLst/>
-          </a:prstGeom>
-          <a:ln>
-            <a:solidFill>
-              <a:schemeClr val="tx1"/>
-            </a:solidFill>
-          </a:ln>
-        </p:spPr>
-        <p:style>
-          <a:lnRef idx="1">
-            <a:schemeClr val="accent1"/>
-          </a:lnRef>
-          <a:fillRef idx="0">
-            <a:schemeClr val="accent1"/>
-          </a:fillRef>
-          <a:effectRef idx="0">
-            <a:schemeClr val="accent1"/>
-          </a:effectRef>
-          <a:fontRef idx="minor">
-            <a:schemeClr val="tx1"/>
-          </a:fontRef>
-        </p:style>
-        <p:txBody>
-          <a:bodyPr rtlCol="0" anchor="ctr"/>
-          <a:lstStyle/>
-          <a:p>
-            <a:pPr algn="ctr"/>
-            <a:endParaRPr lang="ru-RU"/>
-          </a:p>
-        </p:txBody>
-      </p:sp>
-      <p:sp>
-        <p:nvSpPr>
-          <p:cNvPr id="19" name="Левая фигурная скобка 18"/>
-          <p:cNvSpPr/>
-          <p:nvPr/>
-        </p:nvSpPr>
-        <p:spPr>
-          <a:xfrm>
-            <a:off x="6156176" y="4409529"/>
-            <a:ext cx="288032" cy="1683767"/>
-          </a:xfrm>
-          <a:prstGeom prst="leftBrace">
-            <a:avLst/>
-          </a:prstGeom>
-          <a:ln>
-            <a:solidFill>
-              <a:schemeClr val="tx1"/>
-            </a:solidFill>
-          </a:ln>
-        </p:spPr>
-        <p:style>
-          <a:lnRef idx="1">
-            <a:schemeClr val="accent1"/>
-          </a:lnRef>
-          <a:fillRef idx="0">
-            <a:schemeClr val="accent1"/>
-          </a:fillRef>
-          <a:effectRef idx="0">
-            <a:schemeClr val="accent1"/>
-          </a:effectRef>
-          <a:fontRef idx="minor">
-            <a:schemeClr val="tx1"/>
-          </a:fontRef>
-        </p:style>
-        <p:txBody>
-          <a:bodyPr rtlCol="0" anchor="ctr"/>
-          <a:lstStyle/>
-          <a:p>
-            <a:pPr algn="ctr"/>
-            <a:endParaRPr lang="ru-RU"/>
-          </a:p>
-        </p:txBody>
-      </p:sp>
-      <p:cxnSp>
-        <p:nvCxnSpPr>
-          <p:cNvPr id="21" name="Прямая со стрелкой 20"/>
-          <p:cNvCxnSpPr/>
-          <p:nvPr/>
-        </p:nvCxnSpPr>
-        <p:spPr>
-          <a:xfrm>
-            <a:off x="4067944" y="5251412"/>
-            <a:ext cx="1656184" cy="0"/>
-          </a:xfrm>
-          <a:prstGeom prst="straightConnector1">
-            <a:avLst/>
-          </a:prstGeom>
-          <a:ln>
-            <a:solidFill>
-              <a:schemeClr val="tx1"/>
-            </a:solidFill>
-            <a:headEnd type="arrow"/>
-            <a:tailEnd type="arrow"/>
-          </a:ln>
-        </p:spPr>
-        <p:style>
-          <a:lnRef idx="1">
-            <a:schemeClr val="accent1"/>
-          </a:lnRef>
-          <a:fillRef idx="0">
-            <a:schemeClr val="accent1"/>
-          </a:fillRef>
-          <a:effectRef idx="0">
-            <a:schemeClr val="accent1"/>
-          </a:effectRef>
-          <a:fontRef idx="minor">
-            <a:schemeClr val="tx1"/>
-          </a:fontRef>
-        </p:style>
-      </p:cxnSp>
+              <a:rPr lang="ru-RU" dirty="0" smtClean="0">
+                <a:sym typeface="Wingdings" panose="05000000000000000000" pitchFamily="2" charset="2"/>
+              </a:rPr>
+              <a:t>Позволяет быстро сравнить два текста, возвращая в качестве результата работы список объектов вида</a:t>
+            </a:r>
+            <a:r>
+              <a:rPr lang="en-US" dirty="0" smtClean="0">
+                <a:sym typeface="Wingdings" panose="05000000000000000000" pitchFamily="2" charset="2"/>
+              </a:rPr>
+              <a:t>:</a:t>
+            </a:r>
+            <a:endParaRPr lang="ru-RU" dirty="0" smtClean="0">
+              <a:sym typeface="Wingdings" panose="05000000000000000000" pitchFamily="2" charset="2"/>
+            </a:endParaRPr>
+          </a:p>
+          <a:p>
+            <a:pPr marL="0" indent="0" algn="ctr">
+              <a:buNone/>
+            </a:pPr>
+            <a:r>
+              <a:rPr lang="ru-RU" dirty="0" smtClean="0">
+                <a:sym typeface="Wingdings" panose="05000000000000000000" pitchFamily="2" charset="2"/>
+              </a:rPr>
+              <a:t>(</a:t>
+            </a:r>
+            <a:r>
+              <a:rPr lang="en-US" dirty="0" smtClean="0">
+                <a:sym typeface="Wingdings" panose="05000000000000000000" pitchFamily="2" charset="2"/>
+              </a:rPr>
+              <a:t>&lt;type&gt;, &lt;text&gt;)</a:t>
+            </a:r>
+            <a:r>
+              <a:rPr lang="ru-RU" dirty="0" smtClean="0">
+                <a:sym typeface="Wingdings" panose="05000000000000000000" pitchFamily="2" charset="2"/>
+              </a:rPr>
+              <a:t>, </a:t>
+            </a:r>
+            <a:r>
+              <a:rPr lang="en-US" dirty="0" smtClean="0">
+                <a:sym typeface="Wingdings" panose="05000000000000000000" pitchFamily="2" charset="2"/>
+              </a:rPr>
+              <a:t>type – </a:t>
+            </a:r>
+            <a:r>
+              <a:rPr lang="ru-RU" dirty="0" smtClean="0">
+                <a:sym typeface="Wingdings" panose="05000000000000000000" pitchFamily="2" charset="2"/>
+              </a:rPr>
+              <a:t>одного из трех видов: </a:t>
+            </a:r>
+            <a:r>
+              <a:rPr lang="en-US" dirty="0" smtClean="0">
+                <a:sym typeface="Wingdings" panose="05000000000000000000" pitchFamily="2" charset="2"/>
+              </a:rPr>
+              <a:t>EQUAL</a:t>
+            </a:r>
+            <a:endParaRPr lang="ru-RU" dirty="0">
+              <a:sym typeface="Wingdings" panose="05000000000000000000" pitchFamily="2" charset="2"/>
+            </a:endParaRPr>
+          </a:p>
+          <a:p>
+            <a:pPr marL="0" indent="0" algn="ctr">
+              <a:buNone/>
+            </a:pPr>
+            <a:r>
+              <a:rPr lang="en-US" dirty="0" smtClean="0">
+                <a:sym typeface="Wingdings" panose="05000000000000000000" pitchFamily="2" charset="2"/>
+              </a:rPr>
+              <a:t>INSERT</a:t>
+            </a:r>
+            <a:endParaRPr lang="ru-RU" dirty="0" smtClean="0">
+              <a:sym typeface="Wingdings" panose="05000000000000000000" pitchFamily="2" charset="2"/>
+            </a:endParaRPr>
+          </a:p>
+          <a:p>
+            <a:pPr marL="0" indent="0" algn="ctr">
+              <a:buNone/>
+            </a:pPr>
+            <a:r>
+              <a:rPr lang="en-US" dirty="0" smtClean="0">
+                <a:sym typeface="Wingdings" panose="05000000000000000000" pitchFamily="2" charset="2"/>
+              </a:rPr>
+              <a:t>DELETE</a:t>
+            </a:r>
+            <a:r>
+              <a:rPr lang="ru-RU" dirty="0" smtClean="0">
+                <a:sym typeface="Wingdings" panose="05000000000000000000" pitchFamily="2" charset="2"/>
+              </a:rPr>
+              <a:t> </a:t>
+            </a:r>
+            <a:endParaRPr lang="en-US" dirty="0" smtClean="0">
+              <a:sym typeface="Wingdings" panose="05000000000000000000" pitchFamily="2" charset="2"/>
+            </a:endParaRPr>
+          </a:p>
+        </p:txBody>
+      </p:sp>
+      <p:sp>
+        <p:nvSpPr>
+          <p:cNvPr id="4" name="Номер слайда 3"/>
+          <p:cNvSpPr>
+            <a:spLocks noGrp="1"/>
+          </p:cNvSpPr>
+          <p:nvPr>
+            <p:ph type="sldNum" sz="quarter" idx="12"/>
+          </p:nvPr>
+        </p:nvSpPr>
+        <p:spPr/>
+        <p:txBody>
+          <a:bodyPr/>
+          <a:lstStyle/>
+          <a:p>
+            <a:fld id="{B19B0651-EE4F-4900-A07F-96A6BFA9D0F0}" type="slidenum">
+              <a:rPr lang="ru-RU" sz="1800" b="1" smtClean="0">
+                <a:solidFill>
+                  <a:schemeClr val="tx1"/>
+                </a:solidFill>
+              </a:rPr>
+              <a:t>8</a:t>
+            </a:fld>
+            <a:endParaRPr lang="ru-RU" b="1" dirty="0">
+              <a:solidFill>
+                <a:schemeClr val="tx1"/>
+              </a:solidFill>
+            </a:endParaRPr>
+          </a:p>
+        </p:txBody>
+      </p:sp>
     </p:spTree>
     <p:extLst>
       <p:ext uri="{BB962C8B-B14F-4D97-AF65-F5344CB8AC3E}">
-        <p14:creationId xmlns:p14="http://schemas.microsoft.com/office/powerpoint/2010/main" val="2325282235"/>
+        <p14:creationId xmlns:p14="http://schemas.microsoft.com/office/powerpoint/2010/main" val="3683249269"/>
       </p:ext>
     </p:extLst>
   </p:cSld>
@@ -5753,12 +6262,18 @@
         </p:nvSpPr>
         <p:spPr/>
         <p:txBody>
-          <a:bodyPr/>
-          <a:lstStyle/>
-          <a:p>
+          <a:bodyPr>
+            <a:normAutofit/>
+          </a:bodyPr>
+          <a:lstStyle/>
+          <a:p>
+            <a:r>
+              <a:rPr lang="ru-RU" dirty="0"/>
+              <a:t>Преимущества и </a:t>
+            </a:r>
             <a:r>
               <a:rPr lang="ru-RU" dirty="0" smtClean="0"/>
-              <a:t>Алгоритм решения</a:t>
+              <a:t>недостатки</a:t>
             </a:r>
             <a:endParaRPr lang="ru-RU" dirty="0"/>
           </a:p>
@@ -5774,16 +6289,9 @@
             <p:ph idx="1"/>
           </p:nvPr>
         </p:nvSpPr>
-        <p:spPr>
-          <a:xfrm>
-            <a:off x="457200" y="1600200"/>
-            <a:ext cx="8229600" cy="4853136"/>
-          </a:xfrm>
-        </p:spPr>
-        <p:txBody>
-          <a:bodyPr>
-            <a:normAutofit fontScale="85000" lnSpcReduction="10000"/>
-          </a:bodyPr>
+        <p:spPr/>
+        <p:txBody>
+          <a:bodyPr/>
           <a:lstStyle/>
           <a:p>
             <a:pPr marL="0" indent="0">
@@ -5791,129 +6299,94 @@
             </a:pPr>
             <a:r>
               <a:rPr lang="ru-RU" dirty="0" smtClean="0"/>
-              <a:t>Документ </a:t>
-            </a:r>
-            <a:r>
-              <a:rPr lang="ru-RU" dirty="0" smtClean="0">
-                <a:sym typeface="Wingdings" panose="05000000000000000000" pitchFamily="2" charset="2"/>
+              <a:t>+ Независимость от </a:t>
+            </a:r>
+            <a:r>
+              <a:rPr lang="en-US" dirty="0" err="1" smtClean="0"/>
+              <a:t>xhtml</a:t>
+            </a:r>
+            <a:r>
+              <a:rPr lang="en-US" dirty="0" smtClean="0"/>
+              <a:t> </a:t>
+            </a:r>
+            <a:r>
+              <a:rPr lang="ru-RU" dirty="0" smtClean="0"/>
+              <a:t>структуры документов</a:t>
+            </a:r>
+            <a:endParaRPr lang="en-US" dirty="0" smtClean="0"/>
+          </a:p>
+          <a:p>
+            <a:pPr marL="0" indent="0">
+              <a:buNone/>
+            </a:pPr>
+            <a:r>
+              <a:rPr lang="en-US" dirty="0" smtClean="0"/>
+              <a:t>+ </a:t>
+            </a:r>
+            <a:r>
+              <a:rPr lang="ru-RU" dirty="0" smtClean="0"/>
+              <a:t>Скорость работы</a:t>
+            </a:r>
+          </a:p>
+          <a:p>
+            <a:pPr marL="0" indent="0">
+              <a:buNone/>
+            </a:pPr>
+            <a:r>
+              <a:rPr lang="ru-RU" dirty="0" smtClean="0"/>
+              <a:t>- Зависимость от </a:t>
+            </a:r>
+            <a:r>
+              <a:rPr lang="ru-RU" dirty="0" smtClean="0"/>
+              <a:t>результатов работы </a:t>
+            </a:r>
+            <a:r>
+              <a:rPr lang="en-US" dirty="0" smtClean="0"/>
+              <a:t>diff </a:t>
+            </a:r>
+            <a:r>
+              <a:rPr lang="ru-RU" dirty="0" smtClean="0"/>
+              <a:t>алгоритма</a:t>
+            </a:r>
+            <a:endParaRPr lang="ru-RU" dirty="0"/>
+          </a:p>
+        </p:txBody>
+      </p:sp>
+      <p:sp>
+        <p:nvSpPr>
+          <p:cNvPr id="4" name="Номер слайда 3"/>
+          <p:cNvSpPr>
+            <a:spLocks noGrp="1"/>
+          </p:cNvSpPr>
+          <p:nvPr>
+            <p:ph type="sldNum" sz="quarter" idx="12"/>
+          </p:nvPr>
+        </p:nvSpPr>
+        <p:spPr/>
+        <p:txBody>
+          <a:bodyPr/>
+          <a:lstStyle/>
+          <a:p>
+            <a:fld id="{B19B0651-EE4F-4900-A07F-96A6BFA9D0F0}" type="slidenum">
+              <a:rPr lang="ru-RU" sz="1800" b="1" smtClean="0">
+                <a:solidFill>
+                  <a:schemeClr val="tx1"/>
+                </a:solidFill>
               </a:rPr>
-              <a:t></a:t>
-            </a:r>
-            <a:r>
-              <a:rPr lang="en-US" dirty="0" smtClean="0">
-                <a:sym typeface="Wingdings" panose="05000000000000000000" pitchFamily="2" charset="2"/>
-              </a:rPr>
-              <a:t> JDOM2 </a:t>
-            </a:r>
-            <a:r>
-              <a:rPr lang="ru-RU" dirty="0" smtClean="0">
-                <a:sym typeface="Wingdings" panose="05000000000000000000" pitchFamily="2" charset="2"/>
-              </a:rPr>
-              <a:t>дерево </a:t>
-            </a:r>
-            <a:r>
-              <a:rPr lang="en-US" dirty="0" smtClean="0">
-                <a:sym typeface="Wingdings" panose="05000000000000000000" pitchFamily="2" charset="2"/>
-              </a:rPr>
-              <a:t> </a:t>
-            </a:r>
-            <a:r>
-              <a:rPr lang="ru-RU" dirty="0" smtClean="0">
-                <a:sym typeface="Wingdings" panose="05000000000000000000" pitchFamily="2" charset="2"/>
-              </a:rPr>
-              <a:t>Дерево во внутреннем формате </a:t>
-            </a:r>
-            <a:r>
-              <a:rPr lang="en-US" dirty="0" smtClean="0">
-                <a:sym typeface="Wingdings" panose="05000000000000000000" pitchFamily="2" charset="2"/>
-              </a:rPr>
-              <a:t> </a:t>
-            </a:r>
-            <a:r>
-              <a:rPr lang="ru-RU" dirty="0" smtClean="0">
-                <a:sym typeface="Wingdings" panose="05000000000000000000" pitchFamily="2" charset="2"/>
-              </a:rPr>
-              <a:t>Извлечение фрагментов требований.</a:t>
-            </a:r>
-          </a:p>
-          <a:p>
-            <a:pPr marL="0" indent="0">
-              <a:buNone/>
-            </a:pPr>
-            <a:endParaRPr lang="ru-RU" dirty="0">
-              <a:sym typeface="Wingdings" panose="05000000000000000000" pitchFamily="2" charset="2"/>
+              <a:t>9</a:t>
+            </a:fld>
+            <a:endParaRPr lang="ru-RU" b="1" dirty="0">
+              <a:solidFill>
+                <a:schemeClr val="tx1"/>
+              </a:solidFill>
             </a:endParaRPr>
-          </a:p>
-          <a:p>
-            <a:pPr marL="0" indent="0">
-              <a:buNone/>
-            </a:pPr>
-            <a:r>
-              <a:rPr lang="ru-RU" dirty="0" smtClean="0">
-                <a:sym typeface="Wingdings" panose="05000000000000000000" pitchFamily="2" charset="2"/>
-              </a:rPr>
-              <a:t>Для каждого фрагмента требования: </a:t>
-            </a:r>
-          </a:p>
-          <a:p>
-            <a:pPr marL="514350" indent="-514350">
-              <a:buAutoNum type="arabicParenR"/>
-            </a:pPr>
-            <a:r>
-              <a:rPr lang="ru-RU" dirty="0">
-                <a:sym typeface="Wingdings" panose="05000000000000000000" pitchFamily="2" charset="2"/>
-              </a:rPr>
-              <a:t>И</a:t>
-            </a:r>
-            <a:r>
-              <a:rPr lang="ru-RU" dirty="0" smtClean="0">
-                <a:sym typeface="Wingdings" panose="05000000000000000000" pitchFamily="2" charset="2"/>
-              </a:rPr>
-              <a:t>звлечь путь до секции (хедера), в которой находится этот фрагмент</a:t>
-            </a:r>
-          </a:p>
-          <a:p>
-            <a:pPr marL="514350" indent="-514350">
-              <a:buAutoNum type="arabicParenR"/>
-            </a:pPr>
-            <a:r>
-              <a:rPr lang="ru-RU" dirty="0" smtClean="0">
-                <a:sym typeface="Wingdings" panose="05000000000000000000" pitchFamily="2" charset="2"/>
-              </a:rPr>
-              <a:t>Найти аналогичную секцию в конечном документе, извлечь её текст, и обработать (убрать лишние незначащие символы)</a:t>
-            </a:r>
-          </a:p>
-          <a:p>
-            <a:pPr marL="514350" indent="-514350">
-              <a:buAutoNum type="arabicParenR"/>
-            </a:pPr>
-            <a:r>
-              <a:rPr lang="ru-RU" dirty="0" smtClean="0">
-                <a:sym typeface="Wingdings" panose="05000000000000000000" pitchFamily="2" charset="2"/>
-              </a:rPr>
-              <a:t>В явном виде попытаться найти текст фрагмента в тексте секции.</a:t>
-            </a:r>
-          </a:p>
-          <a:p>
-            <a:pPr marL="514350" indent="-514350">
-              <a:buAutoNum type="arabicParenR"/>
-            </a:pPr>
-            <a:endParaRPr lang="ru-RU" dirty="0" smtClean="0">
-              <a:sym typeface="Wingdings" panose="05000000000000000000" pitchFamily="2" charset="2"/>
-            </a:endParaRPr>
-          </a:p>
-          <a:p>
-            <a:pPr marL="514350" indent="-514350">
-              <a:buAutoNum type="arabicParenR"/>
-            </a:pPr>
-            <a:endParaRPr lang="ru-RU" dirty="0"/>
           </a:p>
         </p:txBody>
       </p:sp>
     </p:spTree>
     <p:extLst>
       <p:ext uri="{BB962C8B-B14F-4D97-AF65-F5344CB8AC3E}">
-        <p14:creationId xmlns:p14="http://schemas.microsoft.com/office/powerpoint/2010/main" val="1908474416"/>
+        <p14:creationId xmlns:p14="http://schemas.microsoft.com/office/powerpoint/2010/main" val="4201563964"/>
       </p:ext>
     </p:extLst>
   </p:cSld>
@@ -6211,4 +6684,289 @@
   <a:objectDefaults/>
   <a:extraClrSchemeLst/>
 </a:theme>
+</file>
+
+<file path=ppt/theme/theme2.xml><?xml version="1.0" encoding="utf-8"?>
+<a:theme xmlns:a="http://schemas.openxmlformats.org/drawingml/2006/main" name="Тема Office">
+  <a:themeElements>
+    <a:clrScheme name="Стандартная">
+      <a:dk1>
+        <a:sysClr val="windowText" lastClr="000000"/>
+      </a:dk1>
+      <a:lt1>
+        <a:sysClr val="window" lastClr="FFFFFF"/>
+      </a:lt1>
+      <a:dk2>
+        <a:srgbClr val="1F497D"/>
+      </a:dk2>
+      <a:lt2>
+        <a:srgbClr val="EEECE1"/>
+      </a:lt2>
+      <a:accent1>
+        <a:srgbClr val="4F81BD"/>
+      </a:accent1>
+      <a:accent2>
+        <a:srgbClr val="C0504D"/>
+      </a:accent2>
+      <a:accent3>
+        <a:srgbClr val="9BBB59"/>
+      </a:accent3>
+      <a:accent4>
+        <a:srgbClr val="8064A2"/>
+      </a:accent4>
+      <a:accent5>
+        <a:srgbClr val="4BACC6"/>
+      </a:accent5>
+      <a:accent6>
+        <a:srgbClr val="F79646"/>
+      </a:accent6>
+      <a:hlink>
+        <a:srgbClr val="0000FF"/>
+      </a:hlink>
+      <a:folHlink>
+        <a:srgbClr val="800080"/>
+      </a:folHlink>
+    </a:clrScheme>
+    <a:fontScheme name="Стандартная">
+      <a:majorFont>
+        <a:latin typeface="Calibri"/>
+        <a:ea typeface=""/>
+        <a:cs typeface=""/>
+        <a:font script="Jpan" typeface="ＭＳ Ｐゴシック"/>
+        <a:font script="Hang" typeface="맑은 고딕"/>
+        <a:font script="Hans" typeface="宋体"/>
+        <a:font script="Hant" typeface="新細明體"/>
+        <a:font script="Arab" typeface="Times New Roman"/>
+        <a:font script="Hebr" typeface="Times New Roman"/>
+        <a:font script="Thai" typeface="Angsana New"/>
+        <a:font script="Ethi" typeface="Nyala"/>
+        <a:font script="Beng" typeface="Vrinda"/>
+        <a:font script="Gujr" typeface="Shruti"/>
+        <a:font script="Khmr" typeface="MoolBoran"/>
+        <a:font script="Knda" typeface="Tunga"/>
+        <a:font script="Guru" typeface="Raavi"/>
+        <a:font script="Cans" typeface="Euphemia"/>
+        <a:font script="Cher" typeface="Plantagenet Cherokee"/>
+        <a:font script="Yiii" typeface="Microsoft Yi Baiti"/>
+        <a:font script="Tibt" typeface="Microsoft Himalaya"/>
+        <a:font script="Thaa" typeface="MV Boli"/>
+        <a:font script="Deva" typeface="Mangal"/>
+        <a:font script="Telu" typeface="Gautami"/>
+        <a:font script="Taml" typeface="Latha"/>
+        <a:font script="Syrc" typeface="Estrangelo Edessa"/>
+        <a:font script="Orya" typeface="Kalinga"/>
+        <a:font script="Mlym" typeface="Kartika"/>
+        <a:font script="Laoo" typeface="DokChampa"/>
+        <a:font script="Sinh" typeface="Iskoola Pota"/>
+        <a:font script="Mong" typeface="Mongolian Baiti"/>
+        <a:font script="Viet" typeface="Times New Roman"/>
+        <a:font script="Uigh" typeface="Microsoft Uighur"/>
+        <a:font script="Geor" typeface="Sylfaen"/>
+      </a:majorFont>
+      <a:minorFont>
+        <a:latin typeface="Calibri"/>
+        <a:ea typeface=""/>
+        <a:cs typeface=""/>
+        <a:font script="Jpan" typeface="ＭＳ Ｐゴシック"/>
+        <a:font script="Hang" typeface="맑은 고딕"/>
+        <a:font script="Hans" typeface="宋体"/>
+        <a:font script="Hant" typeface="新細明體"/>
+        <a:font script="Arab" typeface="Arial"/>
+        <a:font script="Hebr" typeface="Arial"/>
+        <a:font script="Thai" typeface="Cordia New"/>
+        <a:font script="Ethi" typeface="Nyala"/>
+        <a:font script="Beng" typeface="Vrinda"/>
+        <a:font script="Gujr" typeface="Shruti"/>
+        <a:font script="Khmr" typeface="DaunPenh"/>
+        <a:font script="Knda" typeface="Tunga"/>
+        <a:font script="Guru" typeface="Raavi"/>
+        <a:font script="Cans" typeface="Euphemia"/>
+        <a:font script="Cher" typeface="Plantagenet Cherokee"/>
+        <a:font script="Yiii" typeface="Microsoft Yi Baiti"/>
+        <a:font script="Tibt" typeface="Microsoft Himalaya"/>
+        <a:font script="Thaa" typeface="MV Boli"/>
+        <a:font script="Deva" typeface="Mangal"/>
+        <a:font script="Telu" typeface="Gautami"/>
+        <a:font script="Taml" typeface="Latha"/>
+        <a:font script="Syrc" typeface="Estrangelo Edessa"/>
+        <a:font script="Orya" typeface="Kalinga"/>
+        <a:font script="Mlym" typeface="Kartika"/>
+        <a:font script="Laoo" typeface="DokChampa"/>
+        <a:font script="Sinh" typeface="Iskoola Pota"/>
+        <a:font script="Mong" typeface="Mongolian Baiti"/>
+        <a:font script="Viet" typeface="Arial"/>
+        <a:font script="Uigh" typeface="Microsoft Uighur"/>
+        <a:font script="Geor" typeface="Sylfaen"/>
+      </a:minorFont>
+    </a:fontScheme>
+    <a:fmtScheme name="Стандартная">
+      <a:fillStyleLst>
+        <a:solidFill>
+          <a:schemeClr val="phClr"/>
+        </a:solidFill>
+        <a:gradFill rotWithShape="1">
+          <a:gsLst>
+            <a:gs pos="0">
+              <a:schemeClr val="phClr">
+                <a:tint val="50000"/>
+                <a:satMod val="300000"/>
+              </a:schemeClr>
+            </a:gs>
+            <a:gs pos="35000">
+              <a:schemeClr val="phClr">
+                <a:tint val="37000"/>
+                <a:satMod val="300000"/>
+              </a:schemeClr>
+            </a:gs>
+            <a:gs pos="100000">
+              <a:schemeClr val="phClr">
+                <a:tint val="15000"/>
+                <a:satMod val="350000"/>
+              </a:schemeClr>
+            </a:gs>
+          </a:gsLst>
+          <a:lin ang="16200000" scaled="1"/>
+        </a:gradFill>
+        <a:gradFill rotWithShape="1">
+          <a:gsLst>
+            <a:gs pos="0">
+              <a:schemeClr val="phClr">
+                <a:shade val="51000"/>
+                <a:satMod val="130000"/>
+              </a:schemeClr>
+            </a:gs>
+            <a:gs pos="80000">
+              <a:schemeClr val="phClr">
+                <a:shade val="93000"/>
+                <a:satMod val="130000"/>
+              </a:schemeClr>
+            </a:gs>
+            <a:gs pos="100000">
+              <a:schemeClr val="phClr">
+                <a:shade val="94000"/>
+                <a:satMod val="135000"/>
+              </a:schemeClr>
+            </a:gs>
+          </a:gsLst>
+          <a:lin ang="16200000" scaled="0"/>
+        </a:gradFill>
+      </a:fillStyleLst>
+      <a:lnStyleLst>
+        <a:ln w="9525" cap="flat" cmpd="sng" algn="ctr">
+          <a:solidFill>
+            <a:schemeClr val="phClr">
+              <a:shade val="95000"/>
+              <a:satMod val="105000"/>
+            </a:schemeClr>
+          </a:solidFill>
+          <a:prstDash val="solid"/>
+        </a:ln>
+        <a:ln w="25400" cap="flat" cmpd="sng" algn="ctr">
+          <a:solidFill>
+            <a:schemeClr val="phClr"/>
+          </a:solidFill>
+          <a:prstDash val="solid"/>
+        </a:ln>
+        <a:ln w="38100" cap="flat" cmpd="sng" algn="ctr">
+          <a:solidFill>
+            <a:schemeClr val="phClr"/>
+          </a:solidFill>
+          <a:prstDash val="solid"/>
+        </a:ln>
+      </a:lnStyleLst>
+      <a:effectStyleLst>
+        <a:effectStyle>
+          <a:effectLst>
+            <a:outerShdw blurRad="40000" dist="20000" dir="5400000" rotWithShape="0">
+              <a:srgbClr val="000000">
+                <a:alpha val="38000"/>
+              </a:srgbClr>
+            </a:outerShdw>
+          </a:effectLst>
+        </a:effectStyle>
+        <a:effectStyle>
+          <a:effectLst>
+            <a:outerShdw blurRad="40000" dist="23000" dir="5400000" rotWithShape="0">
+              <a:srgbClr val="000000">
+                <a:alpha val="35000"/>
+              </a:srgbClr>
+            </a:outerShdw>
+          </a:effectLst>
+        </a:effectStyle>
+        <a:effectStyle>
+          <a:effectLst>
+            <a:outerShdw blurRad="40000" dist="23000" dir="5400000" rotWithShape="0">
+              <a:srgbClr val="000000">
+                <a:alpha val="35000"/>
+              </a:srgbClr>
+            </a:outerShdw>
+          </a:effectLst>
+          <a:scene3d>
+            <a:camera prst="orthographicFront">
+              <a:rot lat="0" lon="0" rev="0"/>
+            </a:camera>
+            <a:lightRig rig="threePt" dir="t">
+              <a:rot lat="0" lon="0" rev="1200000"/>
+            </a:lightRig>
+          </a:scene3d>
+          <a:sp3d>
+            <a:bevelT w="63500" h="25400"/>
+          </a:sp3d>
+        </a:effectStyle>
+      </a:effectStyleLst>
+      <a:bgFillStyleLst>
+        <a:solidFill>
+          <a:schemeClr val="phClr"/>
+        </a:solidFill>
+        <a:gradFill rotWithShape="1">
+          <a:gsLst>
+            <a:gs pos="0">
+              <a:schemeClr val="phClr">
+                <a:tint val="40000"/>
+                <a:satMod val="350000"/>
+              </a:schemeClr>
+            </a:gs>
+            <a:gs pos="40000">
+              <a:schemeClr val="phClr">
+                <a:tint val="45000"/>
+                <a:shade val="99000"/>
+                <a:satMod val="350000"/>
+              </a:schemeClr>
+            </a:gs>
+            <a:gs pos="100000">
+              <a:schemeClr val="phClr">
+                <a:shade val="20000"/>
+                <a:satMod val="255000"/>
+              </a:schemeClr>
+            </a:gs>
+          </a:gsLst>
+          <a:path path="circle">
+            <a:fillToRect l="50000" t="-80000" r="50000" b="180000"/>
+          </a:path>
+        </a:gradFill>
+        <a:gradFill rotWithShape="1">
+          <a:gsLst>
+            <a:gs pos="0">
+              <a:schemeClr val="phClr">
+                <a:tint val="80000"/>
+                <a:satMod val="300000"/>
+              </a:schemeClr>
+            </a:gs>
+            <a:gs pos="100000">
+              <a:schemeClr val="phClr">
+                <a:shade val="30000"/>
+                <a:satMod val="200000"/>
+              </a:schemeClr>
+            </a:gs>
+          </a:gsLst>
+          <a:path path="circle">
+            <a:fillToRect l="50000" t="50000" r="50000" b="50000"/>
+          </a:path>
+        </a:gradFill>
+      </a:bgFillStyleLst>
+    </a:fmtScheme>
+  </a:themeElements>
+  <a:objectDefaults/>
+  <a:extraClrSchemeLst/>
+</a:theme>
 </file>
</xml_diff>